<commit_message>
PPT 기본 구성- 25.11.19.
</commit_message>
<xml_diff>
--- a/ppt/소프트웨어 응용설계 발표자료.pptx
+++ b/ppt/소프트웨어 응용설계 발표자료.pptx
@@ -1,12 +1,36 @@
 
 <file path=ppt/presentation.xml><?xml version="1.0" encoding="utf-8"?>
-<p:presentation xmlns:a="http://schemas.openxmlformats.org/drawingml/2006/main" xmlns:r="http://schemas.openxmlformats.org/officeDocument/2006/relationships" xmlns:p="http://schemas.openxmlformats.org/presentationml/2006/main" saveSubsetFonts="1">
+<p:presentation xmlns:r="http://schemas.openxmlformats.org/officeDocument/2006/relationships" xmlns:c="http://schemas.openxmlformats.org/drawingml/2006/chart" xmlns:a="http://schemas.openxmlformats.org/drawingml/2006/main" xmlns:dgm="http://schemas.openxmlformats.org/drawingml/2006/diagram" xmlns:dsp="http://schemas.microsoft.com/office/drawing/2008/diagram" xmlns:p="http://schemas.openxmlformats.org/presentationml/2006/main">
   <p:sldMasterIdLst>
     <p:sldMasterId id="2147483648" r:id="rId1"/>
   </p:sldMasterIdLst>
   <p:sldIdLst>
     <p:sldId id="256" r:id="rId2"/>
     <p:sldId id="257" r:id="rId3"/>
+    <p:sldId id="258" r:id="rId4"/>
+    <p:sldId id="259" r:id="rId5"/>
+    <p:sldId id="260" r:id="rId6"/>
+    <p:sldId id="261" r:id="rId7"/>
+    <p:sldId id="262" r:id="rId8"/>
+    <p:sldId id="263" r:id="rId9"/>
+    <p:sldId id="264" r:id="rId10"/>
+    <p:sldId id="265" r:id="rId11"/>
+    <p:sldId id="266" r:id="rId12"/>
+    <p:sldId id="267" r:id="rId13"/>
+    <p:sldId id="282" r:id="rId14"/>
+    <p:sldId id="268" r:id="rId15"/>
+    <p:sldId id="269" r:id="rId16"/>
+    <p:sldId id="270" r:id="rId17"/>
+    <p:sldId id="276" r:id="rId18"/>
+    <p:sldId id="277" r:id="rId19"/>
+    <p:sldId id="271" r:id="rId20"/>
+    <p:sldId id="272" r:id="rId21"/>
+    <p:sldId id="278" r:id="rId22"/>
+    <p:sldId id="279" r:id="rId23"/>
+    <p:sldId id="280" r:id="rId24"/>
+    <p:sldId id="273" r:id="rId25"/>
+    <p:sldId id="275" r:id="rId26"/>
+    <p:sldId id="281" r:id="rId27"/>
   </p:sldIdLst>
   <p:sldSz cx="12192000" cy="6858000"/>
   <p:notesSz cx="6858000" cy="9144000"/>
@@ -3453,8 +3477,8 @@
 </p:sld>
 </file>
 
-<file path=ppt/slides/slide2.xml><?xml version="1.0" encoding="utf-8"?>
-<p:sld xmlns:a="http://schemas.openxmlformats.org/drawingml/2006/main" xmlns:r="http://schemas.openxmlformats.org/officeDocument/2006/relationships" xmlns:p="http://schemas.openxmlformats.org/presentationml/2006/main">
+<file path=ppt/slides/slide10.xml><?xml version="1.0" encoding="utf-8"?>
+<p:sld xmlns:r="http://schemas.openxmlformats.org/officeDocument/2006/relationships" xmlns:c="http://schemas.openxmlformats.org/drawingml/2006/chart" xmlns:a="http://schemas.openxmlformats.org/drawingml/2006/main" xmlns:dgm="http://schemas.openxmlformats.org/drawingml/2006/diagram" xmlns:dsp="http://schemas.microsoft.com/office/drawing/2008/diagram" xmlns:p="http://schemas.openxmlformats.org/presentationml/2006/main">
   <p:cSld>
     <p:spTree>
       <p:nvGrpSpPr>
@@ -3472,18 +3496,1044 @@
       </p:grpSpPr>
       <p:sp>
         <p:nvSpPr>
-          <p:cNvPr id="2" name="Title 1">
-            <a:extLst>
-              <a:ext uri="{FF2B5EF4-FFF2-40B4-BE49-F238E27FC236}">
-                <a16:creationId xmlns:a16="http://schemas.microsoft.com/office/drawing/2014/main" id="{BCC23124-4C0D-9ADA-2CF6-3C27A2666291}"/>
-              </a:ext>
-            </a:extLst>
-          </p:cNvPr>
-          <p:cNvSpPr>
-            <a:spLocks noGrp="1"/>
-          </p:cNvSpPr>
-          <p:nvPr>
-            <p:ph type="title"/>
+          <p:cNvPr id="2" name="Title 1"/>
+          <p:cNvSpPr>
+            <a:spLocks noGrp="1"/>
+          </p:cNvSpPr>
+          <p:nvPr>
+            <p:ph type="title" idx="0"/>
+          </p:nvPr>
+        </p:nvSpPr>
+        <p:spPr/>
+        <p:txBody>
+          <a:bodyPr/>
+          <a:p>
+            <a:pPr>
+              <a:defRPr/>
+            </a:pPr>
+            <a:r>
+              <a:rPr lang="ko-KR" altLang="en-US"/>
+              <a:t>과제 </a:t>
+            </a:r>
+            <a:r>
+              <a:rPr lang="en-US" altLang="ko-KR"/>
+              <a:t>4</a:t>
+            </a:r>
+            <a:endParaRPr lang="en-US" altLang="ko-KR"/>
+          </a:p>
+        </p:txBody>
+      </p:sp>
+      <p:sp>
+        <p:nvSpPr>
+          <p:cNvPr id="3" name="Content Placeholder 2"/>
+          <p:cNvSpPr>
+            <a:spLocks noGrp="1"/>
+          </p:cNvSpPr>
+          <p:nvPr>
+            <p:ph idx="1"/>
+          </p:nvPr>
+        </p:nvSpPr>
+        <p:spPr/>
+        <p:txBody>
+          <a:bodyPr/>
+          <a:p>
+            <a:pPr>
+              <a:defRPr/>
+            </a:pPr>
+            <a:r>
+              <a:rPr lang="ko-KR" altLang="en-US"/>
+              <a:t/>
+            </a:r>
+            <a:endParaRPr lang="ko-KR" altLang="en-US"/>
+          </a:p>
+        </p:txBody>
+      </p:sp>
+    </p:spTree>
+    <p:extLst>
+      <p:ext uri="{BB962C8B-B14F-4D97-AF65-F5344CB8AC3E}">
+        <p14:creationId xmlns:p14="http://schemas.microsoft.com/office/powerpoint/2010/main" val="1221419630"/>
+      </p:ext>
+    </p:extLst>
+  </p:cSld>
+  <p:clrMapOvr>
+    <a:masterClrMapping/>
+  </p:clrMapOvr>
+  <mc:AlternateContent xmlns:mc="http://schemas.openxmlformats.org/markup-compatibility/2006">
+    <mc:Choice xmlns:p14="http://schemas.microsoft.com/office/powerpoint/2010/main" Requires="p14">
+      <p:transition xmlns:mc="http://schemas.openxmlformats.org/markup-compatibility/2006" xmlns:p14="http://schemas.microsoft.com/office/powerpoint/2010/main" mc:Ignorable="p14" p14:dur="500"/>
+    </mc:Choice>
+    <mc:Fallback>
+      <p:transition/>
+    </mc:Fallback>
+  </mc:AlternateContent>
+</p:sld>
+</file>
+
+<file path=ppt/slides/slide11.xml><?xml version="1.0" encoding="utf-8"?>
+<p:sld xmlns:r="http://schemas.openxmlformats.org/officeDocument/2006/relationships" xmlns:c="http://schemas.openxmlformats.org/drawingml/2006/chart" xmlns:a="http://schemas.openxmlformats.org/drawingml/2006/main" xmlns:dgm="http://schemas.openxmlformats.org/drawingml/2006/diagram" xmlns:dsp="http://schemas.microsoft.com/office/drawing/2008/diagram" xmlns:p="http://schemas.openxmlformats.org/presentationml/2006/main">
+  <p:cSld>
+    <p:spTree>
+      <p:nvGrpSpPr>
+        <p:cNvPr id="1" name=""/>
+        <p:cNvGrpSpPr/>
+        <p:nvPr/>
+      </p:nvGrpSpPr>
+      <p:grpSpPr>
+        <a:xfrm>
+          <a:off x="0" y="0"/>
+          <a:ext cx="0" cy="0"/>
+          <a:chOff x="0" y="0"/>
+          <a:chExt cx="0" cy="0"/>
+        </a:xfrm>
+      </p:grpSpPr>
+      <p:sp>
+        <p:nvSpPr>
+          <p:cNvPr id="2" name="Title 1"/>
+          <p:cNvSpPr>
+            <a:spLocks noGrp="1"/>
+          </p:cNvSpPr>
+          <p:nvPr>
+            <p:ph type="title" idx="0"/>
+          </p:nvPr>
+        </p:nvSpPr>
+        <p:spPr/>
+        <p:txBody>
+          <a:bodyPr/>
+          <a:p>
+            <a:pPr>
+              <a:defRPr/>
+            </a:pPr>
+            <a:r>
+              <a:rPr lang="ko-KR" altLang="en-US"/>
+              <a:t>과제 </a:t>
+            </a:r>
+            <a:r>
+              <a:rPr lang="en-US" altLang="ko-KR"/>
+              <a:t>5</a:t>
+            </a:r>
+            <a:endParaRPr lang="en-US" altLang="ko-KR"/>
+          </a:p>
+        </p:txBody>
+      </p:sp>
+      <p:sp>
+        <p:nvSpPr>
+          <p:cNvPr id="3" name="Content Placeholder 2"/>
+          <p:cNvSpPr>
+            <a:spLocks noGrp="1"/>
+          </p:cNvSpPr>
+          <p:nvPr>
+            <p:ph idx="1"/>
+          </p:nvPr>
+        </p:nvSpPr>
+        <p:spPr/>
+        <p:txBody>
+          <a:bodyPr/>
+          <a:p>
+            <a:pPr>
+              <a:defRPr/>
+            </a:pPr>
+            <a:r>
+              <a:rPr lang="en-US" altLang="ko-KR"/>
+              <a:t>Risk Management</a:t>
+            </a:r>
+            <a:endParaRPr lang="en-US" altLang="ko-KR"/>
+          </a:p>
+        </p:txBody>
+      </p:sp>
+    </p:spTree>
+    <p:extLst>
+      <p:ext uri="{BB962C8B-B14F-4D97-AF65-F5344CB8AC3E}">
+        <p14:creationId xmlns:p14="http://schemas.microsoft.com/office/powerpoint/2010/main" val="2702592267"/>
+      </p:ext>
+    </p:extLst>
+  </p:cSld>
+  <p:clrMapOvr>
+    <a:masterClrMapping/>
+  </p:clrMapOvr>
+  <mc:AlternateContent xmlns:mc="http://schemas.openxmlformats.org/markup-compatibility/2006">
+    <mc:Choice xmlns:p14="http://schemas.microsoft.com/office/powerpoint/2010/main" Requires="p14">
+      <p:transition xmlns:mc="http://schemas.openxmlformats.org/markup-compatibility/2006" xmlns:p14="http://schemas.microsoft.com/office/powerpoint/2010/main" mc:Ignorable="p14" p14:dur="500"/>
+    </mc:Choice>
+    <mc:Fallback>
+      <p:transition/>
+    </mc:Fallback>
+  </mc:AlternateContent>
+</p:sld>
+</file>
+
+<file path=ppt/slides/slide12.xml><?xml version="1.0" encoding="utf-8"?>
+<p:sld xmlns:r="http://schemas.openxmlformats.org/officeDocument/2006/relationships" xmlns:c="http://schemas.openxmlformats.org/drawingml/2006/chart" xmlns:a="http://schemas.openxmlformats.org/drawingml/2006/main" xmlns:dgm="http://schemas.openxmlformats.org/drawingml/2006/diagram" xmlns:dsp="http://schemas.microsoft.com/office/drawing/2008/diagram" xmlns:p="http://schemas.openxmlformats.org/presentationml/2006/main">
+  <p:cSld>
+    <p:spTree>
+      <p:nvGrpSpPr>
+        <p:cNvPr id="1" name=""/>
+        <p:cNvGrpSpPr/>
+        <p:nvPr/>
+      </p:nvGrpSpPr>
+      <p:grpSpPr>
+        <a:xfrm>
+          <a:off x="0" y="0"/>
+          <a:ext cx="0" cy="0"/>
+          <a:chOff x="0" y="0"/>
+          <a:chExt cx="0" cy="0"/>
+        </a:xfrm>
+      </p:grpSpPr>
+      <p:sp>
+        <p:nvSpPr>
+          <p:cNvPr id="2" name="Title 1"/>
+          <p:cNvSpPr>
+            <a:spLocks noGrp="1"/>
+          </p:cNvSpPr>
+          <p:nvPr>
+            <p:ph type="title" idx="0"/>
+          </p:nvPr>
+        </p:nvSpPr>
+        <p:spPr/>
+        <p:txBody>
+          <a:bodyPr/>
+          <a:p>
+            <a:pPr>
+              <a:defRPr/>
+            </a:pPr>
+            <a:r>
+              <a:rPr lang="ko-KR" altLang="en-US"/>
+              <a:t>과제 </a:t>
+            </a:r>
+            <a:r>
+              <a:rPr lang="en-US" altLang="ko-KR"/>
+              <a:t>5</a:t>
+            </a:r>
+            <a:endParaRPr lang="en-US" altLang="ko-KR"/>
+          </a:p>
+        </p:txBody>
+      </p:sp>
+      <p:sp>
+        <p:nvSpPr>
+          <p:cNvPr id="3" name="Content Placeholder 2"/>
+          <p:cNvSpPr>
+            <a:spLocks noGrp="1"/>
+          </p:cNvSpPr>
+          <p:nvPr>
+            <p:ph idx="1"/>
+          </p:nvPr>
+        </p:nvSpPr>
+        <p:spPr/>
+        <p:txBody>
+          <a:bodyPr/>
+          <a:p>
+            <a:pPr>
+              <a:defRPr/>
+            </a:pPr>
+            <a:r>
+              <a:rPr lang="ko-KR" altLang="en-US"/>
+              <a:t/>
+            </a:r>
+            <a:endParaRPr lang="ko-KR" altLang="en-US"/>
+          </a:p>
+        </p:txBody>
+      </p:sp>
+    </p:spTree>
+    <p:extLst>
+      <p:ext uri="{BB962C8B-B14F-4D97-AF65-F5344CB8AC3E}">
+        <p14:creationId xmlns:p14="http://schemas.microsoft.com/office/powerpoint/2010/main" val="1125589132"/>
+      </p:ext>
+    </p:extLst>
+  </p:cSld>
+  <p:clrMapOvr>
+    <a:masterClrMapping/>
+  </p:clrMapOvr>
+  <mc:AlternateContent xmlns:mc="http://schemas.openxmlformats.org/markup-compatibility/2006">
+    <mc:Choice xmlns:p14="http://schemas.microsoft.com/office/powerpoint/2010/main" Requires="p14">
+      <p:transition xmlns:mc="http://schemas.openxmlformats.org/markup-compatibility/2006" xmlns:p14="http://schemas.microsoft.com/office/powerpoint/2010/main" mc:Ignorable="p14" p14:dur="500"/>
+    </mc:Choice>
+    <mc:Fallback>
+      <p:transition/>
+    </mc:Fallback>
+  </mc:AlternateContent>
+</p:sld>
+</file>
+
+<file path=ppt/slides/slide13.xml><?xml version="1.0" encoding="utf-8"?>
+<p:sld xmlns:r="http://schemas.openxmlformats.org/officeDocument/2006/relationships" xmlns:c="http://schemas.openxmlformats.org/drawingml/2006/chart" xmlns:a="http://schemas.openxmlformats.org/drawingml/2006/main" xmlns:dgm="http://schemas.openxmlformats.org/drawingml/2006/diagram" xmlns:dsp="http://schemas.microsoft.com/office/drawing/2008/diagram" xmlns:p="http://schemas.openxmlformats.org/presentationml/2006/main">
+  <p:cSld>
+    <p:spTree>
+      <p:nvGrpSpPr>
+        <p:cNvPr id="1" name=""/>
+        <p:cNvGrpSpPr/>
+        <p:nvPr/>
+      </p:nvGrpSpPr>
+      <p:grpSpPr>
+        <a:xfrm>
+          <a:off x="0" y="0"/>
+          <a:ext cx="0" cy="0"/>
+          <a:chOff x="0" y="0"/>
+          <a:chExt cx="0" cy="0"/>
+        </a:xfrm>
+      </p:grpSpPr>
+      <p:sp>
+        <p:nvSpPr>
+          <p:cNvPr id="2" name="Title 1"/>
+          <p:cNvSpPr>
+            <a:spLocks noGrp="1"/>
+          </p:cNvSpPr>
+          <p:nvPr>
+            <p:ph type="title" idx="0"/>
+          </p:nvPr>
+        </p:nvSpPr>
+        <p:spPr/>
+        <p:txBody>
+          <a:bodyPr/>
+          <a:p>
+            <a:pPr>
+              <a:defRPr/>
+            </a:pPr>
+            <a:r>
+              <a:rPr lang="ko-KR" altLang="en-US"/>
+              <a:t>과제 </a:t>
+            </a:r>
+            <a:r>
+              <a:rPr lang="en-US" altLang="ko-KR"/>
+              <a:t>5</a:t>
+            </a:r>
+            <a:r>
+              <a:rPr lang="ko-KR" altLang="en-US"/>
+              <a:t> </a:t>
+            </a:r>
+            <a:r>
+              <a:rPr lang="en-US" altLang="ko-KR"/>
+              <a:t>-</a:t>
+            </a:r>
+            <a:r>
+              <a:rPr lang="ko-KR" altLang="en-US"/>
+              <a:t> 그 외 배운 것들</a:t>
+            </a:r>
+            <a:endParaRPr lang="ko-KR" altLang="en-US"/>
+          </a:p>
+        </p:txBody>
+      </p:sp>
+      <p:sp>
+        <p:nvSpPr>
+          <p:cNvPr id="3" name="Content Placeholder 2"/>
+          <p:cNvSpPr>
+            <a:spLocks noGrp="1"/>
+          </p:cNvSpPr>
+          <p:nvPr>
+            <p:ph idx="1"/>
+          </p:nvPr>
+        </p:nvSpPr>
+        <p:spPr/>
+        <p:txBody>
+          <a:bodyPr/>
+          <a:p>
+            <a:pPr>
+              <a:defRPr/>
+            </a:pPr>
+            <a:r>
+              <a:rPr lang="ko-KR" altLang="en-US"/>
+              <a:t>논문 작성법</a:t>
+            </a:r>
+            <a:endParaRPr lang="ko-KR" altLang="en-US"/>
+          </a:p>
+          <a:p>
+            <a:pPr>
+              <a:defRPr/>
+            </a:pPr>
+            <a:r>
+              <a:rPr lang="ko-KR" altLang="en-US"/>
+              <a:t>기능적 요구사항 </a:t>
+            </a:r>
+            <a:r>
+              <a:rPr lang="en-US" altLang="ko-KR"/>
+              <a:t>&amp;</a:t>
+            </a:r>
+            <a:r>
+              <a:rPr lang="ko-KR" altLang="en-US"/>
+              <a:t> 비기능적 요구사항</a:t>
+            </a:r>
+            <a:endParaRPr lang="ko-KR" altLang="en-US"/>
+          </a:p>
+          <a:p>
+            <a:pPr>
+              <a:defRPr/>
+            </a:pPr>
+            <a:r>
+              <a:rPr lang="ko-KR" altLang="en-US"/>
+              <a:t>형상관리</a:t>
+            </a:r>
+            <a:endParaRPr lang="ko-KR" altLang="en-US"/>
+          </a:p>
+        </p:txBody>
+      </p:sp>
+    </p:spTree>
+    <p:extLst>
+      <p:ext uri="{BB962C8B-B14F-4D97-AF65-F5344CB8AC3E}">
+        <p14:creationId xmlns:p14="http://schemas.microsoft.com/office/powerpoint/2010/main" val="4003314342"/>
+      </p:ext>
+    </p:extLst>
+  </p:cSld>
+  <p:clrMapOvr>
+    <a:masterClrMapping/>
+  </p:clrMapOvr>
+  <mc:AlternateContent xmlns:mc="http://schemas.openxmlformats.org/markup-compatibility/2006">
+    <mc:Choice xmlns:p14="http://schemas.microsoft.com/office/powerpoint/2010/main" Requires="p14">
+      <p:transition xmlns:mc="http://schemas.openxmlformats.org/markup-compatibility/2006" xmlns:p14="http://schemas.microsoft.com/office/powerpoint/2010/main" mc:Ignorable="p14" p14:dur="500"/>
+    </mc:Choice>
+    <mc:Fallback>
+      <p:transition/>
+    </mc:Fallback>
+  </mc:AlternateContent>
+</p:sld>
+</file>
+
+<file path=ppt/slides/slide14.xml><?xml version="1.0" encoding="utf-8"?>
+<p:sld xmlns:r="http://schemas.openxmlformats.org/officeDocument/2006/relationships" xmlns:c="http://schemas.openxmlformats.org/drawingml/2006/chart" xmlns:a="http://schemas.openxmlformats.org/drawingml/2006/main" xmlns:dgm="http://schemas.openxmlformats.org/drawingml/2006/diagram" xmlns:dsp="http://schemas.microsoft.com/office/drawing/2008/diagram" xmlns:p="http://schemas.openxmlformats.org/presentationml/2006/main">
+  <p:cSld>
+    <p:spTree>
+      <p:nvGrpSpPr>
+        <p:cNvPr id="1" name=""/>
+        <p:cNvGrpSpPr/>
+        <p:nvPr/>
+      </p:nvGrpSpPr>
+      <p:grpSpPr>
+        <a:xfrm>
+          <a:off x="0" y="0"/>
+          <a:ext cx="0" cy="0"/>
+          <a:chOff x="0" y="0"/>
+          <a:chExt cx="0" cy="0"/>
+        </a:xfrm>
+      </p:grpSpPr>
+      <p:sp>
+        <p:nvSpPr>
+          <p:cNvPr id="2" name="Title 1"/>
+          <p:cNvSpPr>
+            <a:spLocks noGrp="1"/>
+          </p:cNvSpPr>
+          <p:nvPr>
+            <p:ph type="title" idx="0"/>
+          </p:nvPr>
+        </p:nvSpPr>
+        <p:spPr/>
+        <p:txBody>
+          <a:bodyPr/>
+          <a:p>
+            <a:pPr>
+              <a:defRPr/>
+            </a:pPr>
+            <a:r>
+              <a:rPr lang="ko-KR" altLang="en-US"/>
+              <a:t>과제 </a:t>
+            </a:r>
+            <a:r>
+              <a:rPr lang="en-US" altLang="ko-KR"/>
+              <a:t>6</a:t>
+            </a:r>
+            <a:r>
+              <a:rPr lang="ko-KR" altLang="en-US"/>
+              <a:t> </a:t>
+            </a:r>
+            <a:r>
+              <a:rPr lang="en-US" altLang="ko-KR"/>
+              <a:t>-</a:t>
+            </a:r>
+            <a:r>
+              <a:rPr lang="ko-KR" altLang="en-US"/>
+              <a:t> 최종 주제</a:t>
+            </a:r>
+            <a:endParaRPr lang="ko-KR" altLang="en-US"/>
+          </a:p>
+        </p:txBody>
+      </p:sp>
+      <p:sp>
+        <p:nvSpPr>
+          <p:cNvPr id="3" name="Content Placeholder 2"/>
+          <p:cNvSpPr>
+            <a:spLocks noGrp="1"/>
+          </p:cNvSpPr>
+          <p:nvPr>
+            <p:ph idx="1"/>
+          </p:nvPr>
+        </p:nvSpPr>
+        <p:spPr/>
+        <p:txBody>
+          <a:bodyPr/>
+          <a:p>
+            <a:pPr>
+              <a:defRPr/>
+            </a:pPr>
+            <a:r>
+              <a:rPr lang="ko-KR" altLang="en-US"/>
+              <a:t>교내 보행자 안전 시스템에 대한 간단한 설명</a:t>
+            </a:r>
+            <a:endParaRPr lang="ko-KR" altLang="en-US"/>
+          </a:p>
+        </p:txBody>
+      </p:sp>
+    </p:spTree>
+    <p:extLst>
+      <p:ext uri="{BB962C8B-B14F-4D97-AF65-F5344CB8AC3E}">
+        <p14:creationId xmlns:p14="http://schemas.microsoft.com/office/powerpoint/2010/main" val="3766277748"/>
+      </p:ext>
+    </p:extLst>
+  </p:cSld>
+  <p:clrMapOvr>
+    <a:masterClrMapping/>
+  </p:clrMapOvr>
+  <mc:AlternateContent xmlns:mc="http://schemas.openxmlformats.org/markup-compatibility/2006">
+    <mc:Choice xmlns:p14="http://schemas.microsoft.com/office/powerpoint/2010/main" Requires="p14">
+      <p:transition xmlns:mc="http://schemas.openxmlformats.org/markup-compatibility/2006" xmlns:p14="http://schemas.microsoft.com/office/powerpoint/2010/main" mc:Ignorable="p14" p14:dur="500"/>
+    </mc:Choice>
+    <mc:Fallback>
+      <p:transition/>
+    </mc:Fallback>
+  </mc:AlternateContent>
+</p:sld>
+</file>
+
+<file path=ppt/slides/slide15.xml><?xml version="1.0" encoding="utf-8"?>
+<p:sld xmlns:r="http://schemas.openxmlformats.org/officeDocument/2006/relationships" xmlns:c="http://schemas.openxmlformats.org/drawingml/2006/chart" xmlns:a="http://schemas.openxmlformats.org/drawingml/2006/main" xmlns:dgm="http://schemas.openxmlformats.org/drawingml/2006/diagram" xmlns:dsp="http://schemas.microsoft.com/office/drawing/2008/diagram" xmlns:p="http://schemas.openxmlformats.org/presentationml/2006/main">
+  <p:cSld>
+    <p:spTree>
+      <p:nvGrpSpPr>
+        <p:cNvPr id="1" name=""/>
+        <p:cNvGrpSpPr/>
+        <p:nvPr/>
+      </p:nvGrpSpPr>
+      <p:grpSpPr>
+        <a:xfrm>
+          <a:off x="0" y="0"/>
+          <a:ext cx="0" cy="0"/>
+          <a:chOff x="0" y="0"/>
+          <a:chExt cx="0" cy="0"/>
+        </a:xfrm>
+      </p:grpSpPr>
+      <p:sp>
+        <p:nvSpPr>
+          <p:cNvPr id="2" name="Title 1"/>
+          <p:cNvSpPr>
+            <a:spLocks noGrp="1"/>
+          </p:cNvSpPr>
+          <p:nvPr>
+            <p:ph type="title" idx="0"/>
+          </p:nvPr>
+        </p:nvSpPr>
+        <p:spPr/>
+        <p:txBody>
+          <a:bodyPr/>
+          <a:p>
+            <a:pPr>
+              <a:defRPr/>
+            </a:pPr>
+            <a:r>
+              <a:rPr lang="ko-KR" altLang="en-US"/>
+              <a:t>과제 </a:t>
+            </a:r>
+            <a:r>
+              <a:rPr lang="en-US" altLang="ko-KR"/>
+              <a:t>6</a:t>
+            </a:r>
+            <a:r>
+              <a:rPr lang="ko-KR" altLang="en-US"/>
+              <a:t> </a:t>
+            </a:r>
+            <a:r>
+              <a:rPr lang="en-US" altLang="ko-KR"/>
+              <a:t>-</a:t>
+            </a:r>
+            <a:r>
+              <a:rPr lang="ko-KR" altLang="en-US"/>
+              <a:t> 설계과정</a:t>
+            </a:r>
+            <a:endParaRPr lang="ko-KR" altLang="en-US"/>
+          </a:p>
+        </p:txBody>
+      </p:sp>
+      <p:sp>
+        <p:nvSpPr>
+          <p:cNvPr id="3" name="Content Placeholder 2"/>
+          <p:cNvSpPr>
+            <a:spLocks noGrp="1"/>
+          </p:cNvSpPr>
+          <p:nvPr>
+            <p:ph idx="1"/>
+          </p:nvPr>
+        </p:nvSpPr>
+        <p:spPr/>
+        <p:txBody>
+          <a:bodyPr/>
+          <a:p>
+            <a:pPr>
+              <a:defRPr/>
+            </a:pPr>
+            <a:r>
+              <a:rPr lang="ko-KR" altLang="en-US"/>
+              <a:t>설계 단계에서 논의 된 내용을 간략히 설명</a:t>
+            </a:r>
+            <a:endParaRPr lang="ko-KR" altLang="en-US"/>
+          </a:p>
+        </p:txBody>
+      </p:sp>
+    </p:spTree>
+    <p:extLst>
+      <p:ext uri="{BB962C8B-B14F-4D97-AF65-F5344CB8AC3E}">
+        <p14:creationId xmlns:p14="http://schemas.microsoft.com/office/powerpoint/2010/main" val="3617708352"/>
+      </p:ext>
+    </p:extLst>
+  </p:cSld>
+  <p:clrMapOvr>
+    <a:masterClrMapping/>
+  </p:clrMapOvr>
+  <mc:AlternateContent xmlns:mc="http://schemas.openxmlformats.org/markup-compatibility/2006">
+    <mc:Choice xmlns:p14="http://schemas.microsoft.com/office/powerpoint/2010/main" Requires="p14">
+      <p:transition xmlns:mc="http://schemas.openxmlformats.org/markup-compatibility/2006" xmlns:p14="http://schemas.microsoft.com/office/powerpoint/2010/main" mc:Ignorable="p14" p14:dur="500"/>
+    </mc:Choice>
+    <mc:Fallback>
+      <p:transition/>
+    </mc:Fallback>
+  </mc:AlternateContent>
+</p:sld>
+</file>
+
+<file path=ppt/slides/slide16.xml><?xml version="1.0" encoding="utf-8"?>
+<p:sld xmlns:r="http://schemas.openxmlformats.org/officeDocument/2006/relationships" xmlns:c="http://schemas.openxmlformats.org/drawingml/2006/chart" xmlns:a="http://schemas.openxmlformats.org/drawingml/2006/main" xmlns:dgm="http://schemas.openxmlformats.org/drawingml/2006/diagram" xmlns:dsp="http://schemas.microsoft.com/office/drawing/2008/diagram" xmlns:p="http://schemas.openxmlformats.org/presentationml/2006/main">
+  <p:cSld>
+    <p:spTree>
+      <p:nvGrpSpPr>
+        <p:cNvPr id="1" name=""/>
+        <p:cNvGrpSpPr/>
+        <p:nvPr/>
+      </p:nvGrpSpPr>
+      <p:grpSpPr>
+        <a:xfrm>
+          <a:off x="0" y="0"/>
+          <a:ext cx="0" cy="0"/>
+          <a:chOff x="0" y="0"/>
+          <a:chExt cx="0" cy="0"/>
+        </a:xfrm>
+      </p:grpSpPr>
+      <p:sp>
+        <p:nvSpPr>
+          <p:cNvPr id="2" name="Title 1"/>
+          <p:cNvSpPr>
+            <a:spLocks noGrp="1"/>
+          </p:cNvSpPr>
+          <p:nvPr>
+            <p:ph type="title" idx="0"/>
+          </p:nvPr>
+        </p:nvSpPr>
+        <p:spPr/>
+        <p:txBody>
+          <a:bodyPr/>
+          <a:p>
+            <a:pPr>
+              <a:defRPr/>
+            </a:pPr>
+            <a:r>
+              <a:rPr lang="ko-KR" altLang="en-US"/>
+              <a:t>과제 </a:t>
+            </a:r>
+            <a:r>
+              <a:rPr lang="en-US" altLang="ko-KR"/>
+              <a:t>6</a:t>
+            </a:r>
+            <a:r>
+              <a:rPr lang="ko-KR" altLang="en-US"/>
+              <a:t> </a:t>
+            </a:r>
+            <a:r>
+              <a:rPr lang="en-US" altLang="ko-KR"/>
+              <a:t>-</a:t>
+            </a:r>
+            <a:r>
+              <a:rPr lang="ko-KR" altLang="en-US"/>
+              <a:t> 설계과정</a:t>
+            </a:r>
+            <a:endParaRPr lang="en-US" altLang="ko-KR"/>
+          </a:p>
+        </p:txBody>
+      </p:sp>
+      <p:sp>
+        <p:nvSpPr>
+          <p:cNvPr id="3" name="Content Placeholder 2"/>
+          <p:cNvSpPr>
+            <a:spLocks noGrp="1"/>
+          </p:cNvSpPr>
+          <p:nvPr>
+            <p:ph idx="1"/>
+          </p:nvPr>
+        </p:nvSpPr>
+        <p:spPr/>
+        <p:txBody>
+          <a:bodyPr/>
+          <a:p>
+            <a:pPr>
+              <a:defRPr/>
+            </a:pPr>
+            <a:r>
+              <a:rPr lang="ko-KR" altLang="en-US"/>
+              <a:t>최종적으로 설계된 구체적인 내용 설명</a:t>
+            </a:r>
+            <a:endParaRPr lang="ko-KR" altLang="en-US"/>
+          </a:p>
+        </p:txBody>
+      </p:sp>
+    </p:spTree>
+    <p:extLst>
+      <p:ext uri="{BB962C8B-B14F-4D97-AF65-F5344CB8AC3E}">
+        <p14:creationId xmlns:p14="http://schemas.microsoft.com/office/powerpoint/2010/main" val="3477890555"/>
+      </p:ext>
+    </p:extLst>
+  </p:cSld>
+  <p:clrMapOvr>
+    <a:masterClrMapping/>
+  </p:clrMapOvr>
+  <mc:AlternateContent xmlns:mc="http://schemas.openxmlformats.org/markup-compatibility/2006">
+    <mc:Choice xmlns:p14="http://schemas.microsoft.com/office/powerpoint/2010/main" Requires="p14">
+      <p:transition xmlns:mc="http://schemas.openxmlformats.org/markup-compatibility/2006" xmlns:p14="http://schemas.microsoft.com/office/powerpoint/2010/main" mc:Ignorable="p14" p14:dur="500"/>
+    </mc:Choice>
+    <mc:Fallback>
+      <p:transition/>
+    </mc:Fallback>
+  </mc:AlternateContent>
+</p:sld>
+</file>
+
+<file path=ppt/slides/slide17.xml><?xml version="1.0" encoding="utf-8"?>
+<p:sld xmlns:r="http://schemas.openxmlformats.org/officeDocument/2006/relationships" xmlns:c="http://schemas.openxmlformats.org/drawingml/2006/chart" xmlns:a="http://schemas.openxmlformats.org/drawingml/2006/main" xmlns:dgm="http://schemas.openxmlformats.org/drawingml/2006/diagram" xmlns:dsp="http://schemas.microsoft.com/office/drawing/2008/diagram" xmlns:p="http://schemas.openxmlformats.org/presentationml/2006/main">
+  <p:cSld>
+    <p:spTree>
+      <p:nvGrpSpPr>
+        <p:cNvPr id="1" name=""/>
+        <p:cNvGrpSpPr/>
+        <p:nvPr/>
+      </p:nvGrpSpPr>
+      <p:grpSpPr>
+        <a:xfrm>
+          <a:off x="0" y="0"/>
+          <a:ext cx="0" cy="0"/>
+          <a:chOff x="0" y="0"/>
+          <a:chExt cx="0" cy="0"/>
+        </a:xfrm>
+      </p:grpSpPr>
+      <p:sp>
+        <p:nvSpPr>
+          <p:cNvPr id="2" name="Title 1"/>
+          <p:cNvSpPr>
+            <a:spLocks noGrp="1"/>
+          </p:cNvSpPr>
+          <p:nvPr>
+            <p:ph type="title" idx="0"/>
+          </p:nvPr>
+        </p:nvSpPr>
+        <p:spPr/>
+        <p:txBody>
+          <a:bodyPr/>
+          <a:p>
+            <a:pPr>
+              <a:defRPr/>
+            </a:pPr>
+            <a:r>
+              <a:rPr lang="ko-KR" altLang="en-US"/>
+              <a:t>과제 </a:t>
+            </a:r>
+            <a:r>
+              <a:rPr lang="en-US" altLang="ko-KR"/>
+              <a:t>6</a:t>
+            </a:r>
+            <a:r>
+              <a:rPr lang="ko-KR" altLang="en-US"/>
+              <a:t> </a:t>
+            </a:r>
+            <a:r>
+              <a:rPr lang="en-US" altLang="ko-KR"/>
+              <a:t>-</a:t>
+            </a:r>
+            <a:r>
+              <a:rPr lang="ko-KR" altLang="en-US"/>
+              <a:t> 설계과정</a:t>
+            </a:r>
+            <a:endParaRPr lang="en-US" altLang="ko-KR"/>
+          </a:p>
+        </p:txBody>
+      </p:sp>
+      <p:sp>
+        <p:nvSpPr>
+          <p:cNvPr id="3" name="Content Placeholder 2"/>
+          <p:cNvSpPr>
+            <a:spLocks noGrp="1"/>
+          </p:cNvSpPr>
+          <p:nvPr>
+            <p:ph idx="1"/>
+          </p:nvPr>
+        </p:nvSpPr>
+        <p:spPr/>
+        <p:txBody>
+          <a:bodyPr/>
+          <a:p>
+            <a:pPr>
+              <a:defRPr/>
+            </a:pPr>
+            <a:r>
+              <a:rPr lang="ko-KR" altLang="en-US"/>
+              <a:t>최종적으로 설계된 구체적인 내용 설명</a:t>
+            </a:r>
+            <a:endParaRPr lang="ko-KR" altLang="en-US"/>
+          </a:p>
+        </p:txBody>
+      </p:sp>
+    </p:spTree>
+    <p:extLst>
+      <p:ext uri="{BB962C8B-B14F-4D97-AF65-F5344CB8AC3E}">
+        <p14:creationId xmlns:p14="http://schemas.microsoft.com/office/powerpoint/2010/main" val="3528041393"/>
+      </p:ext>
+    </p:extLst>
+  </p:cSld>
+  <p:clrMapOvr>
+    <a:masterClrMapping/>
+  </p:clrMapOvr>
+  <mc:AlternateContent xmlns:mc="http://schemas.openxmlformats.org/markup-compatibility/2006">
+    <mc:Choice xmlns:p14="http://schemas.microsoft.com/office/powerpoint/2010/main" Requires="p14">
+      <p:transition xmlns:mc="http://schemas.openxmlformats.org/markup-compatibility/2006" xmlns:p14="http://schemas.microsoft.com/office/powerpoint/2010/main" mc:Ignorable="p14" p14:dur="500"/>
+    </mc:Choice>
+    <mc:Fallback>
+      <p:transition/>
+    </mc:Fallback>
+  </mc:AlternateContent>
+</p:sld>
+</file>
+
+<file path=ppt/slides/slide18.xml><?xml version="1.0" encoding="utf-8"?>
+<p:sld xmlns:r="http://schemas.openxmlformats.org/officeDocument/2006/relationships" xmlns:c="http://schemas.openxmlformats.org/drawingml/2006/chart" xmlns:a="http://schemas.openxmlformats.org/drawingml/2006/main" xmlns:dgm="http://schemas.openxmlformats.org/drawingml/2006/diagram" xmlns:dsp="http://schemas.microsoft.com/office/drawing/2008/diagram" xmlns:p="http://schemas.openxmlformats.org/presentationml/2006/main">
+  <p:cSld>
+    <p:spTree>
+      <p:nvGrpSpPr>
+        <p:cNvPr id="1" name=""/>
+        <p:cNvGrpSpPr/>
+        <p:nvPr/>
+      </p:nvGrpSpPr>
+      <p:grpSpPr>
+        <a:xfrm>
+          <a:off x="0" y="0"/>
+          <a:ext cx="0" cy="0"/>
+          <a:chOff x="0" y="0"/>
+          <a:chExt cx="0" cy="0"/>
+        </a:xfrm>
+      </p:grpSpPr>
+      <p:sp>
+        <p:nvSpPr>
+          <p:cNvPr id="2" name="Title 1"/>
+          <p:cNvSpPr>
+            <a:spLocks noGrp="1"/>
+          </p:cNvSpPr>
+          <p:nvPr>
+            <p:ph type="title" idx="0"/>
+          </p:nvPr>
+        </p:nvSpPr>
+        <p:spPr/>
+        <p:txBody>
+          <a:bodyPr/>
+          <a:p>
+            <a:pPr>
+              <a:defRPr/>
+            </a:pPr>
+            <a:r>
+              <a:rPr lang="ko-KR" altLang="en-US"/>
+              <a:t>과제 </a:t>
+            </a:r>
+            <a:r>
+              <a:rPr lang="en-US" altLang="ko-KR"/>
+              <a:t>6</a:t>
+            </a:r>
+            <a:r>
+              <a:rPr lang="ko-KR" altLang="en-US"/>
+              <a:t> </a:t>
+            </a:r>
+            <a:r>
+              <a:rPr lang="en-US" altLang="ko-KR"/>
+              <a:t>-</a:t>
+            </a:r>
+            <a:r>
+              <a:rPr lang="ko-KR" altLang="en-US"/>
+              <a:t> 설계과정</a:t>
+            </a:r>
+            <a:endParaRPr lang="en-US" altLang="ko-KR"/>
+          </a:p>
+        </p:txBody>
+      </p:sp>
+      <p:sp>
+        <p:nvSpPr>
+          <p:cNvPr id="3" name="Content Placeholder 2"/>
+          <p:cNvSpPr>
+            <a:spLocks noGrp="1"/>
+          </p:cNvSpPr>
+          <p:nvPr>
+            <p:ph idx="1"/>
+          </p:nvPr>
+        </p:nvSpPr>
+        <p:spPr/>
+        <p:txBody>
+          <a:bodyPr/>
+          <a:p>
+            <a:pPr>
+              <a:defRPr/>
+            </a:pPr>
+            <a:r>
+              <a:rPr lang="ko-KR" altLang="en-US"/>
+              <a:t>최종적으로 설계된 구체적인 내용 설명</a:t>
+            </a:r>
+            <a:endParaRPr lang="ko-KR" altLang="en-US"/>
+          </a:p>
+        </p:txBody>
+      </p:sp>
+    </p:spTree>
+    <p:extLst>
+      <p:ext uri="{BB962C8B-B14F-4D97-AF65-F5344CB8AC3E}">
+        <p14:creationId xmlns:p14="http://schemas.microsoft.com/office/powerpoint/2010/main" val="351644191"/>
+      </p:ext>
+    </p:extLst>
+  </p:cSld>
+  <p:clrMapOvr>
+    <a:masterClrMapping/>
+  </p:clrMapOvr>
+  <mc:AlternateContent xmlns:mc="http://schemas.openxmlformats.org/markup-compatibility/2006">
+    <mc:Choice xmlns:p14="http://schemas.microsoft.com/office/powerpoint/2010/main" Requires="p14">
+      <p:transition xmlns:mc="http://schemas.openxmlformats.org/markup-compatibility/2006" xmlns:p14="http://schemas.microsoft.com/office/powerpoint/2010/main" mc:Ignorable="p14" p14:dur="500"/>
+    </mc:Choice>
+    <mc:Fallback>
+      <p:transition/>
+    </mc:Fallback>
+  </mc:AlternateContent>
+</p:sld>
+</file>
+
+<file path=ppt/slides/slide19.xml><?xml version="1.0" encoding="utf-8"?>
+<p:sld xmlns:r="http://schemas.openxmlformats.org/officeDocument/2006/relationships" xmlns:c="http://schemas.openxmlformats.org/drawingml/2006/chart" xmlns:a="http://schemas.openxmlformats.org/drawingml/2006/main" xmlns:dgm="http://schemas.openxmlformats.org/drawingml/2006/diagram" xmlns:dsp="http://schemas.microsoft.com/office/drawing/2008/diagram" xmlns:p="http://schemas.openxmlformats.org/presentationml/2006/main">
+  <p:cSld>
+    <p:spTree>
+      <p:nvGrpSpPr>
+        <p:cNvPr id="1" name=""/>
+        <p:cNvGrpSpPr/>
+        <p:nvPr/>
+      </p:nvGrpSpPr>
+      <p:grpSpPr>
+        <a:xfrm>
+          <a:off x="0" y="0"/>
+          <a:ext cx="0" cy="0"/>
+          <a:chOff x="0" y="0"/>
+          <a:chExt cx="0" cy="0"/>
+        </a:xfrm>
+      </p:grpSpPr>
+      <p:sp>
+        <p:nvSpPr>
+          <p:cNvPr id="2" name="Title 1"/>
+          <p:cNvSpPr>
+            <a:spLocks noGrp="1"/>
+          </p:cNvSpPr>
+          <p:nvPr>
+            <p:ph type="title" idx="0"/>
+          </p:nvPr>
+        </p:nvSpPr>
+        <p:spPr/>
+        <p:txBody>
+          <a:bodyPr/>
+          <a:p>
+            <a:pPr>
+              <a:defRPr/>
+            </a:pPr>
+            <a:r>
+              <a:rPr lang="ko-KR" altLang="en-US"/>
+              <a:t>과제 </a:t>
+            </a:r>
+            <a:r>
+              <a:rPr lang="en-US" altLang="ko-KR"/>
+              <a:t>6</a:t>
+            </a:r>
+            <a:r>
+              <a:rPr lang="ko-KR" altLang="en-US"/>
+              <a:t> </a:t>
+            </a:r>
+            <a:r>
+              <a:rPr lang="en-US" altLang="ko-KR"/>
+              <a:t>-</a:t>
+            </a:r>
+            <a:r>
+              <a:rPr lang="ko-KR" altLang="en-US"/>
+              <a:t> 개발과정</a:t>
+            </a:r>
+            <a:endParaRPr lang="ko-KR" altLang="en-US"/>
+          </a:p>
+        </p:txBody>
+      </p:sp>
+      <p:sp>
+        <p:nvSpPr>
+          <p:cNvPr id="3" name="Content Placeholder 2"/>
+          <p:cNvSpPr>
+            <a:spLocks noGrp="1"/>
+          </p:cNvSpPr>
+          <p:nvPr>
+            <p:ph idx="1"/>
+          </p:nvPr>
+        </p:nvSpPr>
+        <p:spPr/>
+        <p:txBody>
+          <a:bodyPr/>
+          <a:p>
+            <a:pPr>
+              <a:defRPr/>
+            </a:pPr>
+            <a:r>
+              <a:rPr lang="ko-KR" altLang="en-US"/>
+              <a:t>업무분담</a:t>
+            </a:r>
+            <a:endParaRPr lang="ko-KR" altLang="en-US"/>
+          </a:p>
+        </p:txBody>
+      </p:sp>
+    </p:spTree>
+    <p:extLst>
+      <p:ext uri="{BB962C8B-B14F-4D97-AF65-F5344CB8AC3E}">
+        <p14:creationId xmlns:p14="http://schemas.microsoft.com/office/powerpoint/2010/main" val="772644700"/>
+      </p:ext>
+    </p:extLst>
+  </p:cSld>
+  <p:clrMapOvr>
+    <a:masterClrMapping/>
+  </p:clrMapOvr>
+  <mc:AlternateContent xmlns:mc="http://schemas.openxmlformats.org/markup-compatibility/2006">
+    <mc:Choice xmlns:p14="http://schemas.microsoft.com/office/powerpoint/2010/main" Requires="p14">
+      <p:transition xmlns:mc="http://schemas.openxmlformats.org/markup-compatibility/2006" xmlns:p14="http://schemas.microsoft.com/office/powerpoint/2010/main" mc:Ignorable="p14" p14:dur="500"/>
+    </mc:Choice>
+    <mc:Fallback>
+      <p:transition/>
+    </mc:Fallback>
+  </mc:AlternateContent>
+</p:sld>
+</file>
+
+<file path=ppt/slides/slide2.xml><?xml version="1.0" encoding="utf-8"?>
+<p:sld xmlns:r="http://schemas.openxmlformats.org/officeDocument/2006/relationships" xmlns:c="http://schemas.openxmlformats.org/drawingml/2006/chart" xmlns:a="http://schemas.openxmlformats.org/drawingml/2006/main" xmlns:dgm="http://schemas.openxmlformats.org/drawingml/2006/diagram" xmlns:dsp="http://schemas.microsoft.com/office/drawing/2008/diagram" xmlns:p="http://schemas.openxmlformats.org/presentationml/2006/main">
+  <p:cSld>
+    <p:spTree>
+      <p:nvGrpSpPr>
+        <p:cNvPr id="1" name=""/>
+        <p:cNvGrpSpPr/>
+        <p:nvPr/>
+      </p:nvGrpSpPr>
+      <p:grpSpPr>
+        <a:xfrm>
+          <a:off x="0" y="0"/>
+          <a:ext cx="0" cy="0"/>
+          <a:chOff x="0" y="0"/>
+          <a:chExt cx="0" cy="0"/>
+        </a:xfrm>
+      </p:grpSpPr>
+      <p:sp>
+        <p:nvSpPr>
+          <p:cNvPr id="2" name="Title 1"/>
+          <p:cNvSpPr>
+            <a:spLocks noGrp="1"/>
+          </p:cNvSpPr>
+          <p:nvPr>
+            <p:ph type="title" idx="0"/>
           </p:nvPr>
         </p:nvSpPr>
         <p:spPr/>
@@ -3491,19 +4541,20 @@
           <a:bodyPr/>
           <a:lstStyle/>
           <a:p>
-            <a:endParaRPr lang="ko-KR" altLang="en-US" dirty="0"/>
-          </a:p>
-        </p:txBody>
-      </p:sp>
-      <p:sp>
-        <p:nvSpPr>
-          <p:cNvPr id="3" name="Content Placeholder 2">
-            <a:extLst>
-              <a:ext uri="{FF2B5EF4-FFF2-40B4-BE49-F238E27FC236}">
-                <a16:creationId xmlns:a16="http://schemas.microsoft.com/office/drawing/2014/main" id="{05391F2E-B491-9553-63F7-EB0D6B7D3506}"/>
-              </a:ext>
-            </a:extLst>
-          </p:cNvPr>
+            <a:pPr lvl="0">
+              <a:defRPr/>
+            </a:pPr>
+            <a:r>
+              <a:rPr lang="ko-KR" altLang="en-US"/>
+              <a:t>목차</a:t>
+            </a:r>
+            <a:endParaRPr lang="ko-KR" altLang="en-US"/>
+          </a:p>
+        </p:txBody>
+      </p:sp>
+      <p:sp>
+        <p:nvSpPr>
+          <p:cNvPr id="3" name="Content Placeholder 2"/>
           <p:cNvSpPr>
             <a:spLocks noGrp="1"/>
           </p:cNvSpPr>
@@ -3516,6 +4567,111 @@
           <a:bodyPr/>
           <a:lstStyle/>
           <a:p>
+            <a:pPr marL="399840" lvl="0" indent="-399840">
+              <a:buFont typeface="Wingdings"/>
+              <a:buChar char="§"/>
+              <a:defRPr/>
+            </a:pPr>
+            <a:r>
+              <a:rPr lang="ko-KR" altLang="en-US"/>
+              <a:t>과제 </a:t>
+            </a:r>
+            <a:r>
+              <a:rPr lang="en-US" altLang="ko-KR"/>
+              <a:t>1</a:t>
+            </a:r>
+            <a:endParaRPr lang="en-US" altLang="ko-KR"/>
+          </a:p>
+          <a:p>
+            <a:pPr marL="399840" lvl="0" indent="-399840">
+              <a:buFont typeface="Wingdings"/>
+              <a:buChar char="§"/>
+              <a:defRPr/>
+            </a:pPr>
+            <a:r>
+              <a:rPr lang="ko-KR" altLang="en-US"/>
+              <a:t>과제 </a:t>
+            </a:r>
+            <a:r>
+              <a:rPr lang="en-US" altLang="ko-KR"/>
+              <a:t>2</a:t>
+            </a:r>
+            <a:endParaRPr lang="en-US" altLang="ko-KR"/>
+          </a:p>
+          <a:p>
+            <a:pPr marL="399840" lvl="0" indent="-399840">
+              <a:buFont typeface="Wingdings"/>
+              <a:buChar char="§"/>
+              <a:defRPr/>
+            </a:pPr>
+            <a:r>
+              <a:rPr lang="ko-KR" altLang="en-US"/>
+              <a:t>과제 </a:t>
+            </a:r>
+            <a:r>
+              <a:rPr lang="en-US" altLang="ko-KR"/>
+              <a:t>3</a:t>
+            </a:r>
+            <a:endParaRPr lang="en-US" altLang="ko-KR"/>
+          </a:p>
+          <a:p>
+            <a:pPr marL="399840" lvl="0" indent="-399840">
+              <a:buFont typeface="Wingdings"/>
+              <a:buChar char="§"/>
+              <a:defRPr/>
+            </a:pPr>
+            <a:r>
+              <a:rPr lang="ko-KR" altLang="en-US"/>
+              <a:t>과제 </a:t>
+            </a:r>
+            <a:r>
+              <a:rPr lang="en-US" altLang="ko-KR"/>
+              <a:t>4</a:t>
+            </a:r>
+            <a:endParaRPr lang="en-US" altLang="ko-KR"/>
+          </a:p>
+          <a:p>
+            <a:pPr marL="399840" lvl="0" indent="-399840">
+              <a:buFont typeface="Wingdings"/>
+              <a:buChar char="§"/>
+              <a:defRPr/>
+            </a:pPr>
+            <a:r>
+              <a:rPr lang="ko-KR" altLang="en-US"/>
+              <a:t>과제 </a:t>
+            </a:r>
+            <a:r>
+              <a:rPr lang="en-US" altLang="ko-KR"/>
+              <a:t>5</a:t>
+            </a:r>
+            <a:endParaRPr lang="ko-KR" altLang="en-US"/>
+          </a:p>
+          <a:p>
+            <a:pPr marL="399840" lvl="0" indent="-399840">
+              <a:buFont typeface="Wingdings"/>
+              <a:buChar char="§"/>
+              <a:defRPr/>
+            </a:pPr>
+            <a:r>
+              <a:rPr lang="ko-KR" altLang="en-US"/>
+              <a:t>과제 </a:t>
+            </a:r>
+            <a:r>
+              <a:rPr lang="en-US" altLang="ko-KR"/>
+              <a:t>6</a:t>
+            </a:r>
+            <a:endParaRPr lang="en-US" altLang="ko-KR"/>
+          </a:p>
+          <a:p>
+            <a:pPr marL="399840" lvl="0" indent="-399840">
+              <a:buFont typeface="Wingdings"/>
+              <a:buChar char="§"/>
+              <a:defRPr/>
+            </a:pPr>
+            <a:r>
+              <a:rPr lang="ko-KR" altLang="en-US"/>
+              <a:t>마무리</a:t>
+            </a:r>
             <a:endParaRPr lang="ko-KR" altLang="en-US"/>
           </a:p>
         </p:txBody>
@@ -3530,48 +4686,1454 @@
   <p:clrMapOvr>
     <a:masterClrMapping/>
   </p:clrMapOvr>
+  <mc:AlternateContent xmlns:mc="http://schemas.openxmlformats.org/markup-compatibility/2006">
+    <mc:Choice xmlns:p14="http://schemas.microsoft.com/office/powerpoint/2010/main" Requires="p14">
+      <p:transition xmlns:mc="http://schemas.openxmlformats.org/markup-compatibility/2006" xmlns:p14="http://schemas.microsoft.com/office/powerpoint/2010/main" mc:Ignorable="p14" p14:dur="500"/>
+    </mc:Choice>
+    <mc:Fallback>
+      <p:transition/>
+    </mc:Fallback>
+  </mc:AlternateContent>
+</p:sld>
+</file>
+
+<file path=ppt/slides/slide20.xml><?xml version="1.0" encoding="utf-8"?>
+<p:sld xmlns:r="http://schemas.openxmlformats.org/officeDocument/2006/relationships" xmlns:c="http://schemas.openxmlformats.org/drawingml/2006/chart" xmlns:a="http://schemas.openxmlformats.org/drawingml/2006/main" xmlns:dgm="http://schemas.openxmlformats.org/drawingml/2006/diagram" xmlns:dsp="http://schemas.microsoft.com/office/drawing/2008/diagram" xmlns:p="http://schemas.openxmlformats.org/presentationml/2006/main">
+  <p:cSld>
+    <p:spTree>
+      <p:nvGrpSpPr>
+        <p:cNvPr id="1" name=""/>
+        <p:cNvGrpSpPr/>
+        <p:nvPr/>
+      </p:nvGrpSpPr>
+      <p:grpSpPr>
+        <a:xfrm>
+          <a:off x="0" y="0"/>
+          <a:ext cx="0" cy="0"/>
+          <a:chOff x="0" y="0"/>
+          <a:chExt cx="0" cy="0"/>
+        </a:xfrm>
+      </p:grpSpPr>
+      <p:sp>
+        <p:nvSpPr>
+          <p:cNvPr id="2" name="Title 1"/>
+          <p:cNvSpPr>
+            <a:spLocks noGrp="1"/>
+          </p:cNvSpPr>
+          <p:nvPr>
+            <p:ph type="title" idx="0"/>
+          </p:nvPr>
+        </p:nvSpPr>
+        <p:spPr/>
+        <p:txBody>
+          <a:bodyPr/>
+          <a:p>
+            <a:pPr>
+              <a:defRPr/>
+            </a:pPr>
+            <a:r>
+              <a:rPr lang="ko-KR" altLang="en-US"/>
+              <a:t>과제 </a:t>
+            </a:r>
+            <a:r>
+              <a:rPr lang="en-US" altLang="ko-KR"/>
+              <a:t>6</a:t>
+            </a:r>
+            <a:endParaRPr lang="en-US" altLang="ko-KR"/>
+          </a:p>
+        </p:txBody>
+      </p:sp>
+      <p:sp>
+        <p:nvSpPr>
+          <p:cNvPr id="3" name="Content Placeholder 2"/>
+          <p:cNvSpPr>
+            <a:spLocks noGrp="1"/>
+          </p:cNvSpPr>
+          <p:nvPr>
+            <p:ph idx="1"/>
+          </p:nvPr>
+        </p:nvSpPr>
+        <p:spPr/>
+        <p:txBody>
+          <a:bodyPr/>
+          <a:p>
+            <a:pPr>
+              <a:defRPr/>
+            </a:pPr>
+            <a:r>
+              <a:rPr lang="ko-KR" altLang="en-US"/>
+              <a:t>실제 개발 과정</a:t>
+            </a:r>
+            <a:r>
+              <a:rPr lang="en-US" altLang="ko-KR"/>
+              <a:t>(</a:t>
+            </a:r>
+            <a:r>
+              <a:rPr lang="ko-KR" altLang="en-US"/>
+              <a:t>형상관리 이미지 포함</a:t>
+            </a:r>
+            <a:r>
+              <a:rPr lang="en-US" altLang="ko-KR"/>
+              <a:t>)</a:t>
+            </a:r>
+            <a:endParaRPr lang="en-US" altLang="ko-KR"/>
+          </a:p>
+        </p:txBody>
+      </p:sp>
+    </p:spTree>
+    <p:extLst>
+      <p:ext uri="{BB962C8B-B14F-4D97-AF65-F5344CB8AC3E}">
+        <p14:creationId xmlns:p14="http://schemas.microsoft.com/office/powerpoint/2010/main" val="3472285578"/>
+      </p:ext>
+    </p:extLst>
+  </p:cSld>
+  <p:clrMapOvr>
+    <a:masterClrMapping/>
+  </p:clrMapOvr>
+  <mc:AlternateContent xmlns:mc="http://schemas.openxmlformats.org/markup-compatibility/2006">
+    <mc:Choice xmlns:p14="http://schemas.microsoft.com/office/powerpoint/2010/main" Requires="p14">
+      <p:transition xmlns:mc="http://schemas.openxmlformats.org/markup-compatibility/2006" xmlns:p14="http://schemas.microsoft.com/office/powerpoint/2010/main" mc:Ignorable="p14" p14:dur="500"/>
+    </mc:Choice>
+    <mc:Fallback>
+      <p:transition/>
+    </mc:Fallback>
+  </mc:AlternateContent>
+</p:sld>
+</file>
+
+<file path=ppt/slides/slide21.xml><?xml version="1.0" encoding="utf-8"?>
+<p:sld xmlns:r="http://schemas.openxmlformats.org/officeDocument/2006/relationships" xmlns:c="http://schemas.openxmlformats.org/drawingml/2006/chart" xmlns:a="http://schemas.openxmlformats.org/drawingml/2006/main" xmlns:dgm="http://schemas.openxmlformats.org/drawingml/2006/diagram" xmlns:dsp="http://schemas.microsoft.com/office/drawing/2008/diagram" xmlns:p="http://schemas.openxmlformats.org/presentationml/2006/main">
+  <p:cSld>
+    <p:spTree>
+      <p:nvGrpSpPr>
+        <p:cNvPr id="1" name=""/>
+        <p:cNvGrpSpPr/>
+        <p:nvPr/>
+      </p:nvGrpSpPr>
+      <p:grpSpPr>
+        <a:xfrm>
+          <a:off x="0" y="0"/>
+          <a:ext cx="0" cy="0"/>
+          <a:chOff x="0" y="0"/>
+          <a:chExt cx="0" cy="0"/>
+        </a:xfrm>
+      </p:grpSpPr>
+      <p:sp>
+        <p:nvSpPr>
+          <p:cNvPr id="2" name="Title 1"/>
+          <p:cNvSpPr>
+            <a:spLocks noGrp="1"/>
+          </p:cNvSpPr>
+          <p:nvPr>
+            <p:ph type="title" idx="0"/>
+          </p:nvPr>
+        </p:nvSpPr>
+        <p:spPr/>
+        <p:txBody>
+          <a:bodyPr/>
+          <a:p>
+            <a:pPr>
+              <a:defRPr/>
+            </a:pPr>
+            <a:r>
+              <a:rPr lang="ko-KR" altLang="en-US"/>
+              <a:t>과제 </a:t>
+            </a:r>
+            <a:r>
+              <a:rPr lang="en-US" altLang="ko-KR"/>
+              <a:t>6</a:t>
+            </a:r>
+            <a:endParaRPr lang="en-US" altLang="ko-KR"/>
+          </a:p>
+        </p:txBody>
+      </p:sp>
+      <p:sp>
+        <p:nvSpPr>
+          <p:cNvPr id="3" name="Content Placeholder 2"/>
+          <p:cNvSpPr>
+            <a:spLocks noGrp="1"/>
+          </p:cNvSpPr>
+          <p:nvPr>
+            <p:ph idx="1"/>
+          </p:nvPr>
+        </p:nvSpPr>
+        <p:spPr/>
+        <p:txBody>
+          <a:bodyPr/>
+          <a:p>
+            <a:pPr>
+              <a:defRPr/>
+            </a:pPr>
+            <a:r>
+              <a:rPr lang="ko-KR" altLang="en-US"/>
+              <a:t>실제 개발 과정</a:t>
+            </a:r>
+            <a:r>
+              <a:rPr lang="en-US" altLang="ko-KR"/>
+              <a:t>(</a:t>
+            </a:r>
+            <a:r>
+              <a:rPr lang="ko-KR" altLang="en-US"/>
+              <a:t>형상관리 이미지 포함</a:t>
+            </a:r>
+            <a:r>
+              <a:rPr lang="en-US" altLang="ko-KR"/>
+              <a:t>)</a:t>
+            </a:r>
+            <a:endParaRPr lang="en-US" altLang="ko-KR"/>
+          </a:p>
+        </p:txBody>
+      </p:sp>
+    </p:spTree>
+    <p:extLst>
+      <p:ext uri="{BB962C8B-B14F-4D97-AF65-F5344CB8AC3E}">
+        <p14:creationId xmlns:p14="http://schemas.microsoft.com/office/powerpoint/2010/main" val="1974054042"/>
+      </p:ext>
+    </p:extLst>
+  </p:cSld>
+  <p:clrMapOvr>
+    <a:masterClrMapping/>
+  </p:clrMapOvr>
+  <mc:AlternateContent xmlns:mc="http://schemas.openxmlformats.org/markup-compatibility/2006">
+    <mc:Choice xmlns:p14="http://schemas.microsoft.com/office/powerpoint/2010/main" Requires="p14">
+      <p:transition xmlns:mc="http://schemas.openxmlformats.org/markup-compatibility/2006" xmlns:p14="http://schemas.microsoft.com/office/powerpoint/2010/main" mc:Ignorable="p14" p14:dur="500"/>
+    </mc:Choice>
+    <mc:Fallback>
+      <p:transition/>
+    </mc:Fallback>
+  </mc:AlternateContent>
+</p:sld>
+</file>
+
+<file path=ppt/slides/slide22.xml><?xml version="1.0" encoding="utf-8"?>
+<p:sld xmlns:r="http://schemas.openxmlformats.org/officeDocument/2006/relationships" xmlns:c="http://schemas.openxmlformats.org/drawingml/2006/chart" xmlns:a="http://schemas.openxmlformats.org/drawingml/2006/main" xmlns:dgm="http://schemas.openxmlformats.org/drawingml/2006/diagram" xmlns:dsp="http://schemas.microsoft.com/office/drawing/2008/diagram" xmlns:p="http://schemas.openxmlformats.org/presentationml/2006/main">
+  <p:cSld>
+    <p:spTree>
+      <p:nvGrpSpPr>
+        <p:cNvPr id="1" name=""/>
+        <p:cNvGrpSpPr/>
+        <p:nvPr/>
+      </p:nvGrpSpPr>
+      <p:grpSpPr>
+        <a:xfrm>
+          <a:off x="0" y="0"/>
+          <a:ext cx="0" cy="0"/>
+          <a:chOff x="0" y="0"/>
+          <a:chExt cx="0" cy="0"/>
+        </a:xfrm>
+      </p:grpSpPr>
+      <p:sp>
+        <p:nvSpPr>
+          <p:cNvPr id="2" name="Title 1"/>
+          <p:cNvSpPr>
+            <a:spLocks noGrp="1"/>
+          </p:cNvSpPr>
+          <p:nvPr>
+            <p:ph type="title" idx="0"/>
+          </p:nvPr>
+        </p:nvSpPr>
+        <p:spPr/>
+        <p:txBody>
+          <a:bodyPr/>
+          <a:p>
+            <a:pPr>
+              <a:defRPr/>
+            </a:pPr>
+            <a:r>
+              <a:rPr lang="ko-KR" altLang="en-US"/>
+              <a:t>과제 </a:t>
+            </a:r>
+            <a:r>
+              <a:rPr lang="en-US" altLang="ko-KR"/>
+              <a:t>6</a:t>
+            </a:r>
+            <a:endParaRPr lang="en-US" altLang="ko-KR"/>
+          </a:p>
+        </p:txBody>
+      </p:sp>
+      <p:sp>
+        <p:nvSpPr>
+          <p:cNvPr id="3" name="Content Placeholder 2"/>
+          <p:cNvSpPr>
+            <a:spLocks noGrp="1"/>
+          </p:cNvSpPr>
+          <p:nvPr>
+            <p:ph idx="1"/>
+          </p:nvPr>
+        </p:nvSpPr>
+        <p:spPr/>
+        <p:txBody>
+          <a:bodyPr/>
+          <a:p>
+            <a:pPr>
+              <a:defRPr/>
+            </a:pPr>
+            <a:r>
+              <a:rPr lang="ko-KR" altLang="en-US"/>
+              <a:t>실제 개발 과정</a:t>
+            </a:r>
+            <a:r>
+              <a:rPr lang="en-US" altLang="ko-KR"/>
+              <a:t>(</a:t>
+            </a:r>
+            <a:r>
+              <a:rPr lang="ko-KR" altLang="en-US"/>
+              <a:t>형상관리 이미지 포함</a:t>
+            </a:r>
+            <a:r>
+              <a:rPr lang="en-US" altLang="ko-KR"/>
+              <a:t>)</a:t>
+            </a:r>
+            <a:endParaRPr lang="en-US" altLang="ko-KR"/>
+          </a:p>
+        </p:txBody>
+      </p:sp>
+    </p:spTree>
+    <p:extLst>
+      <p:ext uri="{BB962C8B-B14F-4D97-AF65-F5344CB8AC3E}">
+        <p14:creationId xmlns:p14="http://schemas.microsoft.com/office/powerpoint/2010/main" val="2702122447"/>
+      </p:ext>
+    </p:extLst>
+  </p:cSld>
+  <p:clrMapOvr>
+    <a:masterClrMapping/>
+  </p:clrMapOvr>
+  <mc:AlternateContent xmlns:mc="http://schemas.openxmlformats.org/markup-compatibility/2006">
+    <mc:Choice xmlns:p14="http://schemas.microsoft.com/office/powerpoint/2010/main" Requires="p14">
+      <p:transition xmlns:mc="http://schemas.openxmlformats.org/markup-compatibility/2006" xmlns:p14="http://schemas.microsoft.com/office/powerpoint/2010/main" mc:Ignorable="p14" p14:dur="500"/>
+    </mc:Choice>
+    <mc:Fallback>
+      <p:transition/>
+    </mc:Fallback>
+  </mc:AlternateContent>
+</p:sld>
+</file>
+
+<file path=ppt/slides/slide23.xml><?xml version="1.0" encoding="utf-8"?>
+<p:sld xmlns:r="http://schemas.openxmlformats.org/officeDocument/2006/relationships" xmlns:c="http://schemas.openxmlformats.org/drawingml/2006/chart" xmlns:a="http://schemas.openxmlformats.org/drawingml/2006/main" xmlns:dgm="http://schemas.openxmlformats.org/drawingml/2006/diagram" xmlns:dsp="http://schemas.microsoft.com/office/drawing/2008/diagram" xmlns:p="http://schemas.openxmlformats.org/presentationml/2006/main">
+  <p:cSld>
+    <p:spTree>
+      <p:nvGrpSpPr>
+        <p:cNvPr id="1" name=""/>
+        <p:cNvGrpSpPr/>
+        <p:nvPr/>
+      </p:nvGrpSpPr>
+      <p:grpSpPr>
+        <a:xfrm>
+          <a:off x="0" y="0"/>
+          <a:ext cx="0" cy="0"/>
+          <a:chOff x="0" y="0"/>
+          <a:chExt cx="0" cy="0"/>
+        </a:xfrm>
+      </p:grpSpPr>
+      <p:sp>
+        <p:nvSpPr>
+          <p:cNvPr id="2" name="Title 1"/>
+          <p:cNvSpPr>
+            <a:spLocks noGrp="1"/>
+          </p:cNvSpPr>
+          <p:nvPr>
+            <p:ph type="title" idx="0"/>
+          </p:nvPr>
+        </p:nvSpPr>
+        <p:spPr/>
+        <p:txBody>
+          <a:bodyPr/>
+          <a:p>
+            <a:pPr>
+              <a:defRPr/>
+            </a:pPr>
+            <a:r>
+              <a:rPr lang="ko-KR" altLang="en-US"/>
+              <a:t>과제 </a:t>
+            </a:r>
+            <a:r>
+              <a:rPr lang="en-US" altLang="ko-KR"/>
+              <a:t>6</a:t>
+            </a:r>
+            <a:endParaRPr lang="en-US" altLang="ko-KR"/>
+          </a:p>
+        </p:txBody>
+      </p:sp>
+      <p:sp>
+        <p:nvSpPr>
+          <p:cNvPr id="3" name="Content Placeholder 2"/>
+          <p:cNvSpPr>
+            <a:spLocks noGrp="1"/>
+          </p:cNvSpPr>
+          <p:nvPr>
+            <p:ph idx="1"/>
+          </p:nvPr>
+        </p:nvSpPr>
+        <p:spPr/>
+        <p:txBody>
+          <a:bodyPr/>
+          <a:p>
+            <a:pPr>
+              <a:defRPr/>
+            </a:pPr>
+            <a:r>
+              <a:rPr lang="ko-KR" altLang="en-US"/>
+              <a:t>실제 개발 과정</a:t>
+            </a:r>
+            <a:r>
+              <a:rPr lang="en-US" altLang="ko-KR"/>
+              <a:t>(</a:t>
+            </a:r>
+            <a:r>
+              <a:rPr lang="ko-KR" altLang="en-US"/>
+              <a:t>형상관리 이미지 포함</a:t>
+            </a:r>
+            <a:r>
+              <a:rPr lang="en-US" altLang="ko-KR"/>
+              <a:t>)</a:t>
+            </a:r>
+            <a:endParaRPr lang="en-US" altLang="ko-KR"/>
+          </a:p>
+        </p:txBody>
+      </p:sp>
+    </p:spTree>
+    <p:extLst>
+      <p:ext uri="{BB962C8B-B14F-4D97-AF65-F5344CB8AC3E}">
+        <p14:creationId xmlns:p14="http://schemas.microsoft.com/office/powerpoint/2010/main" val="1937611099"/>
+      </p:ext>
+    </p:extLst>
+  </p:cSld>
+  <p:clrMapOvr>
+    <a:masterClrMapping/>
+  </p:clrMapOvr>
+  <mc:AlternateContent xmlns:mc="http://schemas.openxmlformats.org/markup-compatibility/2006">
+    <mc:Choice xmlns:p14="http://schemas.microsoft.com/office/powerpoint/2010/main" Requires="p14">
+      <p:transition xmlns:mc="http://schemas.openxmlformats.org/markup-compatibility/2006" xmlns:p14="http://schemas.microsoft.com/office/powerpoint/2010/main" mc:Ignorable="p14" p14:dur="500"/>
+    </mc:Choice>
+    <mc:Fallback>
+      <p:transition/>
+    </mc:Fallback>
+  </mc:AlternateContent>
+</p:sld>
+</file>
+
+<file path=ppt/slides/slide24.xml><?xml version="1.0" encoding="utf-8"?>
+<p:sld xmlns:r="http://schemas.openxmlformats.org/officeDocument/2006/relationships" xmlns:c="http://schemas.openxmlformats.org/drawingml/2006/chart" xmlns:a="http://schemas.openxmlformats.org/drawingml/2006/main" xmlns:dgm="http://schemas.openxmlformats.org/drawingml/2006/diagram" xmlns:dsp="http://schemas.microsoft.com/office/drawing/2008/diagram" xmlns:p="http://schemas.openxmlformats.org/presentationml/2006/main">
+  <p:cSld>
+    <p:spTree>
+      <p:nvGrpSpPr>
+        <p:cNvPr id="1" name=""/>
+        <p:cNvGrpSpPr/>
+        <p:nvPr/>
+      </p:nvGrpSpPr>
+      <p:grpSpPr>
+        <a:xfrm>
+          <a:off x="0" y="0"/>
+          <a:ext cx="0" cy="0"/>
+          <a:chOff x="0" y="0"/>
+          <a:chExt cx="0" cy="0"/>
+        </a:xfrm>
+      </p:grpSpPr>
+      <p:sp>
+        <p:nvSpPr>
+          <p:cNvPr id="2" name="Title 1"/>
+          <p:cNvSpPr>
+            <a:spLocks noGrp="1"/>
+          </p:cNvSpPr>
+          <p:nvPr>
+            <p:ph type="title" idx="0"/>
+          </p:nvPr>
+        </p:nvSpPr>
+        <p:spPr/>
+        <p:txBody>
+          <a:bodyPr/>
+          <a:p>
+            <a:pPr>
+              <a:defRPr/>
+            </a:pPr>
+            <a:r>
+              <a:rPr lang="ko-KR" altLang="en-US"/>
+              <a:t>과제 </a:t>
+            </a:r>
+            <a:r>
+              <a:rPr lang="en-US" altLang="ko-KR"/>
+              <a:t>6</a:t>
+            </a:r>
+            <a:r>
+              <a:rPr lang="ko-KR" altLang="en-US"/>
+              <a:t> </a:t>
+            </a:r>
+            <a:r>
+              <a:rPr lang="en-US" altLang="ko-KR"/>
+              <a:t>-</a:t>
+            </a:r>
+            <a:r>
+              <a:rPr lang="ko-KR" altLang="en-US"/>
+              <a:t> </a:t>
+            </a:r>
+            <a:r>
+              <a:rPr lang="en-US" altLang="ko-KR"/>
+              <a:t>DEMO</a:t>
+            </a:r>
+            <a:endParaRPr lang="en-US" altLang="ko-KR"/>
+          </a:p>
+        </p:txBody>
+      </p:sp>
+      <p:sp>
+        <p:nvSpPr>
+          <p:cNvPr id="3" name="Content Placeholder 2"/>
+          <p:cNvSpPr>
+            <a:spLocks noGrp="1"/>
+          </p:cNvSpPr>
+          <p:nvPr>
+            <p:ph idx="1"/>
+          </p:nvPr>
+        </p:nvSpPr>
+        <p:spPr/>
+        <p:txBody>
+          <a:bodyPr/>
+          <a:p>
+            <a:pPr>
+              <a:defRPr/>
+            </a:pPr>
+            <a:r>
+              <a:rPr lang="ko-KR" altLang="en-US"/>
+              <a:t/>
+            </a:r>
+            <a:endParaRPr lang="ko-KR" altLang="en-US"/>
+          </a:p>
+        </p:txBody>
+      </p:sp>
+    </p:spTree>
+    <p:extLst>
+      <p:ext uri="{BB962C8B-B14F-4D97-AF65-F5344CB8AC3E}">
+        <p14:creationId xmlns:p14="http://schemas.microsoft.com/office/powerpoint/2010/main" val="4259749821"/>
+      </p:ext>
+    </p:extLst>
+  </p:cSld>
+  <p:clrMapOvr>
+    <a:masterClrMapping/>
+  </p:clrMapOvr>
+  <mc:AlternateContent xmlns:mc="http://schemas.openxmlformats.org/markup-compatibility/2006">
+    <mc:Choice xmlns:p14="http://schemas.microsoft.com/office/powerpoint/2010/main" Requires="p14">
+      <p:transition xmlns:mc="http://schemas.openxmlformats.org/markup-compatibility/2006" xmlns:p14="http://schemas.microsoft.com/office/powerpoint/2010/main" mc:Ignorable="p14" p14:dur="500"/>
+    </mc:Choice>
+    <mc:Fallback>
+      <p:transition/>
+    </mc:Fallback>
+  </mc:AlternateContent>
+</p:sld>
+</file>
+
+<file path=ppt/slides/slide25.xml><?xml version="1.0" encoding="utf-8"?>
+<p:sld xmlns:r="http://schemas.openxmlformats.org/officeDocument/2006/relationships" xmlns:c="http://schemas.openxmlformats.org/drawingml/2006/chart" xmlns:a="http://schemas.openxmlformats.org/drawingml/2006/main" xmlns:dgm="http://schemas.openxmlformats.org/drawingml/2006/diagram" xmlns:dsp="http://schemas.microsoft.com/office/drawing/2008/diagram" xmlns:p="http://schemas.openxmlformats.org/presentationml/2006/main">
+  <p:cSld>
+    <p:spTree>
+      <p:nvGrpSpPr>
+        <p:cNvPr id="1" name=""/>
+        <p:cNvGrpSpPr/>
+        <p:nvPr/>
+      </p:nvGrpSpPr>
+      <p:grpSpPr>
+        <a:xfrm>
+          <a:off x="0" y="0"/>
+          <a:ext cx="0" cy="0"/>
+          <a:chOff x="0" y="0"/>
+          <a:chExt cx="0" cy="0"/>
+        </a:xfrm>
+      </p:grpSpPr>
+      <p:sp>
+        <p:nvSpPr>
+          <p:cNvPr id="2" name="Title 1"/>
+          <p:cNvSpPr>
+            <a:spLocks noGrp="1"/>
+          </p:cNvSpPr>
+          <p:nvPr>
+            <p:ph type="title" idx="0"/>
+          </p:nvPr>
+        </p:nvSpPr>
+        <p:spPr/>
+        <p:txBody>
+          <a:bodyPr/>
+          <a:p>
+            <a:pPr>
+              <a:defRPr/>
+            </a:pPr>
+            <a:r>
+              <a:rPr lang="ko-KR" altLang="en-US"/>
+              <a:t>마무리</a:t>
+            </a:r>
+            <a:endParaRPr lang="ko-KR" altLang="en-US"/>
+          </a:p>
+        </p:txBody>
+      </p:sp>
+      <p:sp>
+        <p:nvSpPr>
+          <p:cNvPr id="3" name="Content Placeholder 2"/>
+          <p:cNvSpPr>
+            <a:spLocks noGrp="1"/>
+          </p:cNvSpPr>
+          <p:nvPr>
+            <p:ph idx="1"/>
+          </p:nvPr>
+        </p:nvSpPr>
+        <p:spPr/>
+        <p:txBody>
+          <a:bodyPr/>
+          <a:p>
+            <a:pPr>
+              <a:defRPr/>
+            </a:pPr>
+            <a:r>
+              <a:rPr lang="ko-KR" altLang="en-US"/>
+              <a:t>한 학기 마무리 감상</a:t>
+            </a:r>
+            <a:endParaRPr lang="ko-KR" altLang="en-US"/>
+          </a:p>
+        </p:txBody>
+      </p:sp>
+    </p:spTree>
+    <p:extLst>
+      <p:ext uri="{BB962C8B-B14F-4D97-AF65-F5344CB8AC3E}">
+        <p14:creationId xmlns:p14="http://schemas.microsoft.com/office/powerpoint/2010/main" val="1606031116"/>
+      </p:ext>
+    </p:extLst>
+  </p:cSld>
+  <p:clrMapOvr>
+    <a:masterClrMapping/>
+  </p:clrMapOvr>
+  <mc:AlternateContent xmlns:mc="http://schemas.openxmlformats.org/markup-compatibility/2006">
+    <mc:Choice xmlns:p14="http://schemas.microsoft.com/office/powerpoint/2010/main" Requires="p14">
+      <p:transition xmlns:mc="http://schemas.openxmlformats.org/markup-compatibility/2006" xmlns:p14="http://schemas.microsoft.com/office/powerpoint/2010/main" mc:Ignorable="p14" p14:dur="500"/>
+    </mc:Choice>
+    <mc:Fallback>
+      <p:transition/>
+    </mc:Fallback>
+  </mc:AlternateContent>
+</p:sld>
+</file>
+
+<file path=ppt/slides/slide26.xml><?xml version="1.0" encoding="utf-8"?>
+<p:sld xmlns:r="http://schemas.openxmlformats.org/officeDocument/2006/relationships" xmlns:c="http://schemas.openxmlformats.org/drawingml/2006/chart" xmlns:a="http://schemas.openxmlformats.org/drawingml/2006/main" xmlns:dgm="http://schemas.openxmlformats.org/drawingml/2006/diagram" xmlns:dsp="http://schemas.microsoft.com/office/drawing/2008/diagram" xmlns:p="http://schemas.openxmlformats.org/presentationml/2006/main">
+  <p:cSld>
+    <p:spTree>
+      <p:nvGrpSpPr>
+        <p:cNvPr id="1" name=""/>
+        <p:cNvGrpSpPr/>
+        <p:nvPr/>
+      </p:nvGrpSpPr>
+      <p:grpSpPr>
+        <a:xfrm>
+          <a:off x="0" y="0"/>
+          <a:ext cx="0" cy="0"/>
+          <a:chOff x="0" y="0"/>
+          <a:chExt cx="0" cy="0"/>
+        </a:xfrm>
+      </p:grpSpPr>
+      <p:sp>
+        <p:nvSpPr>
+          <p:cNvPr id="2" name="Title 1"/>
+          <p:cNvSpPr>
+            <a:spLocks noGrp="1"/>
+          </p:cNvSpPr>
+          <p:nvPr>
+            <p:ph type="title" idx="0"/>
+          </p:nvPr>
+        </p:nvSpPr>
+        <p:spPr/>
+        <p:txBody>
+          <a:bodyPr/>
+          <a:p>
+            <a:pPr>
+              <a:defRPr/>
+            </a:pPr>
+            <a:r>
+              <a:rPr lang="ko-KR" altLang="en-US"/>
+              <a:t/>
+            </a:r>
+            <a:endParaRPr lang="ko-KR" altLang="en-US"/>
+          </a:p>
+        </p:txBody>
+      </p:sp>
+      <p:sp>
+        <p:nvSpPr>
+          <p:cNvPr id="3" name="Content Placeholder 2"/>
+          <p:cNvSpPr>
+            <a:spLocks noGrp="1"/>
+          </p:cNvSpPr>
+          <p:nvPr>
+            <p:ph idx="1"/>
+          </p:nvPr>
+        </p:nvSpPr>
+        <p:spPr/>
+        <p:txBody>
+          <a:bodyPr/>
+          <a:p>
+            <a:pPr>
+              <a:defRPr/>
+            </a:pPr>
+            <a:r>
+              <a:rPr lang="ko-KR" altLang="en-US"/>
+              <a:t>감사합니다</a:t>
+            </a:r>
+            <a:endParaRPr lang="ko-KR" altLang="en-US"/>
+          </a:p>
+        </p:txBody>
+      </p:sp>
+    </p:spTree>
+    <p:extLst>
+      <p:ext uri="{BB962C8B-B14F-4D97-AF65-F5344CB8AC3E}">
+        <p14:creationId xmlns:p14="http://schemas.microsoft.com/office/powerpoint/2010/main" val="1216268954"/>
+      </p:ext>
+    </p:extLst>
+  </p:cSld>
+  <p:clrMapOvr>
+    <a:masterClrMapping/>
+  </p:clrMapOvr>
+  <mc:AlternateContent xmlns:mc="http://schemas.openxmlformats.org/markup-compatibility/2006">
+    <mc:Choice xmlns:p14="http://schemas.microsoft.com/office/powerpoint/2010/main" Requires="p14">
+      <p:transition xmlns:mc="http://schemas.openxmlformats.org/markup-compatibility/2006" xmlns:p14="http://schemas.microsoft.com/office/powerpoint/2010/main" mc:Ignorable="p14" p14:dur="500"/>
+    </mc:Choice>
+    <mc:Fallback>
+      <p:transition/>
+    </mc:Fallback>
+  </mc:AlternateContent>
+</p:sld>
+</file>
+
+<file path=ppt/slides/slide3.xml><?xml version="1.0" encoding="utf-8"?>
+<p:sld xmlns:r="http://schemas.openxmlformats.org/officeDocument/2006/relationships" xmlns:c="http://schemas.openxmlformats.org/drawingml/2006/chart" xmlns:a="http://schemas.openxmlformats.org/drawingml/2006/main" xmlns:dgm="http://schemas.openxmlformats.org/drawingml/2006/diagram" xmlns:dsp="http://schemas.microsoft.com/office/drawing/2008/diagram" xmlns:p="http://schemas.openxmlformats.org/presentationml/2006/main">
+  <p:cSld>
+    <p:spTree>
+      <p:nvGrpSpPr>
+        <p:cNvPr id="1" name=""/>
+        <p:cNvGrpSpPr/>
+        <p:nvPr/>
+      </p:nvGrpSpPr>
+      <p:grpSpPr>
+        <a:xfrm>
+          <a:off x="0" y="0"/>
+          <a:ext cx="0" cy="0"/>
+          <a:chOff x="0" y="0"/>
+          <a:chExt cx="0" cy="0"/>
+        </a:xfrm>
+      </p:grpSpPr>
+      <p:sp>
+        <p:nvSpPr>
+          <p:cNvPr id="2" name="Title 1"/>
+          <p:cNvSpPr>
+            <a:spLocks noGrp="1"/>
+          </p:cNvSpPr>
+          <p:nvPr>
+            <p:ph type="title" idx="0"/>
+          </p:nvPr>
+        </p:nvSpPr>
+        <p:spPr/>
+        <p:txBody>
+          <a:bodyPr/>
+          <a:p>
+            <a:pPr>
+              <a:defRPr/>
+            </a:pPr>
+            <a:r>
+              <a:rPr lang="ko-KR" altLang="en-US"/>
+              <a:t>과제 </a:t>
+            </a:r>
+            <a:r>
+              <a:rPr lang="en-US" altLang="ko-KR"/>
+              <a:t>1</a:t>
+            </a:r>
+            <a:endParaRPr lang="en-US" altLang="ko-KR"/>
+          </a:p>
+        </p:txBody>
+      </p:sp>
+      <p:sp>
+        <p:nvSpPr>
+          <p:cNvPr id="3" name="Content Placeholder 2"/>
+          <p:cNvSpPr>
+            <a:spLocks noGrp="1"/>
+          </p:cNvSpPr>
+          <p:nvPr>
+            <p:ph idx="1"/>
+          </p:nvPr>
+        </p:nvSpPr>
+        <p:spPr/>
+        <p:txBody>
+          <a:bodyPr/>
+          <a:p>
+            <a:pPr>
+              <a:defRPr/>
+            </a:pPr>
+            <a:r>
+              <a:rPr lang="en-US" altLang="ko-KR"/>
+              <a:t>Reliability</a:t>
+            </a:r>
+            <a:endParaRPr lang="en-US" altLang="ko-KR"/>
+          </a:p>
+          <a:p>
+            <a:pPr>
+              <a:defRPr/>
+            </a:pPr>
+            <a:r>
+              <a:rPr lang="en-US" altLang="ko-KR"/>
+              <a:t>Autonomic Computing</a:t>
+            </a:r>
+            <a:endParaRPr lang="en-US" altLang="ko-KR"/>
+          </a:p>
+          <a:p>
+            <a:pPr>
+              <a:defRPr/>
+            </a:pPr>
+            <a:r>
+              <a:rPr lang="en-US" altLang="ko-KR"/>
+              <a:t>4-SELF</a:t>
+            </a:r>
+            <a:endParaRPr lang="en-US" altLang="ko-KR"/>
+          </a:p>
+        </p:txBody>
+      </p:sp>
+    </p:spTree>
+    <p:extLst>
+      <p:ext uri="{BB962C8B-B14F-4D97-AF65-F5344CB8AC3E}">
+        <p14:creationId xmlns:p14="http://schemas.microsoft.com/office/powerpoint/2010/main" val="3131922428"/>
+      </p:ext>
+    </p:extLst>
+  </p:cSld>
+  <p:clrMapOvr>
+    <a:masterClrMapping/>
+  </p:clrMapOvr>
+  <mc:AlternateContent xmlns:mc="http://schemas.openxmlformats.org/markup-compatibility/2006">
+    <mc:Choice xmlns:p14="http://schemas.microsoft.com/office/powerpoint/2010/main" Requires="p14">
+      <p:transition xmlns:mc="http://schemas.openxmlformats.org/markup-compatibility/2006" xmlns:p14="http://schemas.microsoft.com/office/powerpoint/2010/main" mc:Ignorable="p14" p14:dur="500"/>
+    </mc:Choice>
+    <mc:Fallback>
+      <p:transition/>
+    </mc:Fallback>
+  </mc:AlternateContent>
+</p:sld>
+</file>
+
+<file path=ppt/slides/slide4.xml><?xml version="1.0" encoding="utf-8"?>
+<p:sld xmlns:r="http://schemas.openxmlformats.org/officeDocument/2006/relationships" xmlns:c="http://schemas.openxmlformats.org/drawingml/2006/chart" xmlns:a="http://schemas.openxmlformats.org/drawingml/2006/main" xmlns:dgm="http://schemas.openxmlformats.org/drawingml/2006/diagram" xmlns:dsp="http://schemas.microsoft.com/office/drawing/2008/diagram" xmlns:p="http://schemas.openxmlformats.org/presentationml/2006/main">
+  <p:cSld>
+    <p:spTree>
+      <p:nvGrpSpPr>
+        <p:cNvPr id="1" name=""/>
+        <p:cNvGrpSpPr/>
+        <p:nvPr/>
+      </p:nvGrpSpPr>
+      <p:grpSpPr>
+        <a:xfrm>
+          <a:off x="0" y="0"/>
+          <a:ext cx="0" cy="0"/>
+          <a:chOff x="0" y="0"/>
+          <a:chExt cx="0" cy="0"/>
+        </a:xfrm>
+      </p:grpSpPr>
+      <p:sp>
+        <p:nvSpPr>
+          <p:cNvPr id="2" name="Title 1"/>
+          <p:cNvSpPr>
+            <a:spLocks noGrp="1"/>
+          </p:cNvSpPr>
+          <p:nvPr>
+            <p:ph type="title" idx="0"/>
+          </p:nvPr>
+        </p:nvSpPr>
+        <p:spPr/>
+        <p:txBody>
+          <a:bodyPr/>
+          <a:p>
+            <a:pPr>
+              <a:defRPr/>
+            </a:pPr>
+            <a:r>
+              <a:rPr lang="ko-KR" altLang="en-US"/>
+              <a:t>과제 </a:t>
+            </a:r>
+            <a:r>
+              <a:rPr lang="en-US" altLang="ko-KR"/>
+              <a:t>1</a:t>
+            </a:r>
+            <a:endParaRPr lang="en-US" altLang="ko-KR"/>
+          </a:p>
+        </p:txBody>
+      </p:sp>
+      <p:sp>
+        <p:nvSpPr>
+          <p:cNvPr id="3" name="Content Placeholder 2"/>
+          <p:cNvSpPr>
+            <a:spLocks noGrp="1"/>
+          </p:cNvSpPr>
+          <p:nvPr>
+            <p:ph idx="1"/>
+          </p:nvPr>
+        </p:nvSpPr>
+        <p:spPr/>
+        <p:txBody>
+          <a:bodyPr/>
+          <a:p>
+            <a:pPr>
+              <a:defRPr/>
+            </a:pPr>
+            <a:r>
+              <a:rPr lang="ko-KR" altLang="en-US"/>
+              <a:t/>
+            </a:r>
+            <a:endParaRPr lang="ko-KR" altLang="en-US"/>
+          </a:p>
+        </p:txBody>
+      </p:sp>
+    </p:spTree>
+    <p:extLst>
+      <p:ext uri="{BB962C8B-B14F-4D97-AF65-F5344CB8AC3E}">
+        <p14:creationId xmlns:p14="http://schemas.microsoft.com/office/powerpoint/2010/main" val="46954630"/>
+      </p:ext>
+    </p:extLst>
+  </p:cSld>
+  <p:clrMapOvr>
+    <a:masterClrMapping/>
+  </p:clrMapOvr>
+  <mc:AlternateContent xmlns:mc="http://schemas.openxmlformats.org/markup-compatibility/2006">
+    <mc:Choice xmlns:p14="http://schemas.microsoft.com/office/powerpoint/2010/main" Requires="p14">
+      <p:transition xmlns:mc="http://schemas.openxmlformats.org/markup-compatibility/2006" xmlns:p14="http://schemas.microsoft.com/office/powerpoint/2010/main" mc:Ignorable="p14" p14:dur="500"/>
+    </mc:Choice>
+    <mc:Fallback>
+      <p:transition/>
+    </mc:Fallback>
+  </mc:AlternateContent>
+</p:sld>
+</file>
+
+<file path=ppt/slides/slide5.xml><?xml version="1.0" encoding="utf-8"?>
+<p:sld xmlns:r="http://schemas.openxmlformats.org/officeDocument/2006/relationships" xmlns:c="http://schemas.openxmlformats.org/drawingml/2006/chart" xmlns:a="http://schemas.openxmlformats.org/drawingml/2006/main" xmlns:dgm="http://schemas.openxmlformats.org/drawingml/2006/diagram" xmlns:dsp="http://schemas.microsoft.com/office/drawing/2008/diagram" xmlns:p="http://schemas.openxmlformats.org/presentationml/2006/main">
+  <p:cSld>
+    <p:spTree>
+      <p:nvGrpSpPr>
+        <p:cNvPr id="1" name=""/>
+        <p:cNvGrpSpPr/>
+        <p:nvPr/>
+      </p:nvGrpSpPr>
+      <p:grpSpPr>
+        <a:xfrm>
+          <a:off x="0" y="0"/>
+          <a:ext cx="0" cy="0"/>
+          <a:chOff x="0" y="0"/>
+          <a:chExt cx="0" cy="0"/>
+        </a:xfrm>
+      </p:grpSpPr>
+      <p:sp>
+        <p:nvSpPr>
+          <p:cNvPr id="2" name="Title 1"/>
+          <p:cNvSpPr>
+            <a:spLocks noGrp="1"/>
+          </p:cNvSpPr>
+          <p:nvPr>
+            <p:ph type="title" idx="0"/>
+          </p:nvPr>
+        </p:nvSpPr>
+        <p:spPr/>
+        <p:txBody>
+          <a:bodyPr/>
+          <a:p>
+            <a:pPr>
+              <a:defRPr/>
+            </a:pPr>
+            <a:r>
+              <a:rPr lang="ko-KR" altLang="en-US"/>
+              <a:t>과제 </a:t>
+            </a:r>
+            <a:r>
+              <a:rPr lang="en-US" altLang="ko-KR"/>
+              <a:t>2</a:t>
+            </a:r>
+            <a:endParaRPr lang="en-US" altLang="ko-KR"/>
+          </a:p>
+        </p:txBody>
+      </p:sp>
+      <p:sp>
+        <p:nvSpPr>
+          <p:cNvPr id="3" name="Content Placeholder 2"/>
+          <p:cNvSpPr>
+            <a:spLocks noGrp="1"/>
+          </p:cNvSpPr>
+          <p:nvPr>
+            <p:ph idx="1"/>
+          </p:nvPr>
+        </p:nvSpPr>
+        <p:spPr/>
+        <p:txBody>
+          <a:bodyPr/>
+          <a:p>
+            <a:pPr>
+              <a:defRPr/>
+            </a:pPr>
+            <a:r>
+              <a:rPr lang="en-US" altLang="ko-KR"/>
+              <a:t>MAPE</a:t>
+            </a:r>
+            <a:endParaRPr lang="en-US" altLang="ko-KR"/>
+          </a:p>
+          <a:p>
+            <a:pPr>
+              <a:defRPr/>
+            </a:pPr>
+            <a:r>
+              <a:rPr lang="ko-KR" altLang="en-US"/>
+              <a:t>필드와 레코드</a:t>
+            </a:r>
+            <a:endParaRPr lang="ko-KR" altLang="en-US"/>
+          </a:p>
+          <a:p>
+            <a:pPr>
+              <a:defRPr/>
+            </a:pPr>
+            <a:r>
+              <a:rPr lang="en-US" altLang="ko-KR"/>
+              <a:t>CASE</a:t>
+            </a:r>
+            <a:r>
+              <a:rPr lang="ko-KR" altLang="en-US"/>
+              <a:t> 도구</a:t>
+            </a:r>
+            <a:endParaRPr lang="ko-KR" altLang="en-US"/>
+          </a:p>
+        </p:txBody>
+      </p:sp>
+    </p:spTree>
+    <p:extLst>
+      <p:ext uri="{BB962C8B-B14F-4D97-AF65-F5344CB8AC3E}">
+        <p14:creationId xmlns:p14="http://schemas.microsoft.com/office/powerpoint/2010/main" val="1289967885"/>
+      </p:ext>
+    </p:extLst>
+  </p:cSld>
+  <p:clrMapOvr>
+    <a:masterClrMapping/>
+  </p:clrMapOvr>
+  <mc:AlternateContent xmlns:mc="http://schemas.openxmlformats.org/markup-compatibility/2006">
+    <mc:Choice xmlns:p14="http://schemas.microsoft.com/office/powerpoint/2010/main" Requires="p14">
+      <p:transition xmlns:mc="http://schemas.openxmlformats.org/markup-compatibility/2006" xmlns:p14="http://schemas.microsoft.com/office/powerpoint/2010/main" mc:Ignorable="p14" p14:dur="500"/>
+    </mc:Choice>
+    <mc:Fallback>
+      <p:transition/>
+    </mc:Fallback>
+  </mc:AlternateContent>
+</p:sld>
+</file>
+
+<file path=ppt/slides/slide6.xml><?xml version="1.0" encoding="utf-8"?>
+<p:sld xmlns:r="http://schemas.openxmlformats.org/officeDocument/2006/relationships" xmlns:c="http://schemas.openxmlformats.org/drawingml/2006/chart" xmlns:a="http://schemas.openxmlformats.org/drawingml/2006/main" xmlns:dgm="http://schemas.openxmlformats.org/drawingml/2006/diagram" xmlns:dsp="http://schemas.microsoft.com/office/drawing/2008/diagram" xmlns:p="http://schemas.openxmlformats.org/presentationml/2006/main">
+  <p:cSld>
+    <p:spTree>
+      <p:nvGrpSpPr>
+        <p:cNvPr id="1" name=""/>
+        <p:cNvGrpSpPr/>
+        <p:nvPr/>
+      </p:nvGrpSpPr>
+      <p:grpSpPr>
+        <a:xfrm>
+          <a:off x="0" y="0"/>
+          <a:ext cx="0" cy="0"/>
+          <a:chOff x="0" y="0"/>
+          <a:chExt cx="0" cy="0"/>
+        </a:xfrm>
+      </p:grpSpPr>
+      <p:sp>
+        <p:nvSpPr>
+          <p:cNvPr id="2" name="Title 1"/>
+          <p:cNvSpPr>
+            <a:spLocks noGrp="1"/>
+          </p:cNvSpPr>
+          <p:nvPr>
+            <p:ph type="title" idx="0"/>
+          </p:nvPr>
+        </p:nvSpPr>
+        <p:spPr/>
+        <p:txBody>
+          <a:bodyPr/>
+          <a:p>
+            <a:pPr>
+              <a:defRPr/>
+            </a:pPr>
+            <a:r>
+              <a:rPr lang="ko-KR" altLang="en-US"/>
+              <a:t>과제 </a:t>
+            </a:r>
+            <a:r>
+              <a:rPr lang="en-US" altLang="ko-KR"/>
+              <a:t>2</a:t>
+            </a:r>
+            <a:endParaRPr lang="ko-KR" altLang="en-US"/>
+          </a:p>
+        </p:txBody>
+      </p:sp>
+      <p:sp>
+        <p:nvSpPr>
+          <p:cNvPr id="3" name="Content Placeholder 2"/>
+          <p:cNvSpPr>
+            <a:spLocks noGrp="1"/>
+          </p:cNvSpPr>
+          <p:nvPr>
+            <p:ph idx="1"/>
+          </p:nvPr>
+        </p:nvSpPr>
+        <p:spPr/>
+        <p:txBody>
+          <a:bodyPr/>
+          <a:p>
+            <a:pPr>
+              <a:defRPr/>
+            </a:pPr>
+            <a:r>
+              <a:rPr lang="ko-KR" altLang="en-US"/>
+              <a:t/>
+            </a:r>
+            <a:endParaRPr lang="ko-KR" altLang="en-US"/>
+          </a:p>
+        </p:txBody>
+      </p:sp>
+    </p:spTree>
+    <p:extLst>
+      <p:ext uri="{BB962C8B-B14F-4D97-AF65-F5344CB8AC3E}">
+        <p14:creationId xmlns:p14="http://schemas.microsoft.com/office/powerpoint/2010/main" val="1805315102"/>
+      </p:ext>
+    </p:extLst>
+  </p:cSld>
+  <p:clrMapOvr>
+    <a:masterClrMapping/>
+  </p:clrMapOvr>
+  <mc:AlternateContent xmlns:mc="http://schemas.openxmlformats.org/markup-compatibility/2006">
+    <mc:Choice xmlns:p14="http://schemas.microsoft.com/office/powerpoint/2010/main" Requires="p14">
+      <p:transition xmlns:mc="http://schemas.openxmlformats.org/markup-compatibility/2006" xmlns:p14="http://schemas.microsoft.com/office/powerpoint/2010/main" mc:Ignorable="p14" p14:dur="500"/>
+    </mc:Choice>
+    <mc:Fallback>
+      <p:transition/>
+    </mc:Fallback>
+  </mc:AlternateContent>
+</p:sld>
+</file>
+
+<file path=ppt/slides/slide7.xml><?xml version="1.0" encoding="utf-8"?>
+<p:sld xmlns:r="http://schemas.openxmlformats.org/officeDocument/2006/relationships" xmlns:c="http://schemas.openxmlformats.org/drawingml/2006/chart" xmlns:a="http://schemas.openxmlformats.org/drawingml/2006/main" xmlns:dgm="http://schemas.openxmlformats.org/drawingml/2006/diagram" xmlns:dsp="http://schemas.microsoft.com/office/drawing/2008/diagram" xmlns:p="http://schemas.openxmlformats.org/presentationml/2006/main">
+  <p:cSld>
+    <p:spTree>
+      <p:nvGrpSpPr>
+        <p:cNvPr id="1" name=""/>
+        <p:cNvGrpSpPr/>
+        <p:nvPr/>
+      </p:nvGrpSpPr>
+      <p:grpSpPr>
+        <a:xfrm>
+          <a:off x="0" y="0"/>
+          <a:ext cx="0" cy="0"/>
+          <a:chOff x="0" y="0"/>
+          <a:chExt cx="0" cy="0"/>
+        </a:xfrm>
+      </p:grpSpPr>
+      <p:sp>
+        <p:nvSpPr>
+          <p:cNvPr id="2" name="Title 1"/>
+          <p:cNvSpPr>
+            <a:spLocks noGrp="1"/>
+          </p:cNvSpPr>
+          <p:nvPr>
+            <p:ph type="title" idx="0"/>
+          </p:nvPr>
+        </p:nvSpPr>
+        <p:spPr/>
+        <p:txBody>
+          <a:bodyPr/>
+          <a:p>
+            <a:pPr>
+              <a:defRPr/>
+            </a:pPr>
+            <a:r>
+              <a:rPr lang="ko-KR" altLang="en-US"/>
+              <a:t>과제 </a:t>
+            </a:r>
+            <a:r>
+              <a:rPr lang="en-US" altLang="ko-KR"/>
+              <a:t>3</a:t>
+            </a:r>
+            <a:endParaRPr lang="ko-KR" altLang="en-US"/>
+          </a:p>
+        </p:txBody>
+      </p:sp>
+      <p:sp>
+        <p:nvSpPr>
+          <p:cNvPr id="3" name="Content Placeholder 2"/>
+          <p:cNvSpPr>
+            <a:spLocks noGrp="1"/>
+          </p:cNvSpPr>
+          <p:nvPr>
+            <p:ph idx="1"/>
+          </p:nvPr>
+        </p:nvSpPr>
+        <p:spPr/>
+        <p:txBody>
+          <a:bodyPr/>
+          <a:p>
+            <a:pPr>
+              <a:defRPr/>
+            </a:pPr>
+            <a:r>
+              <a:rPr lang="ko-KR" altLang="en-US"/>
+              <a:t>시퀀스 다이어그램</a:t>
+            </a:r>
+            <a:endParaRPr lang="ko-KR" altLang="en-US"/>
+          </a:p>
+          <a:p>
+            <a:pPr>
+              <a:defRPr/>
+            </a:pPr>
+            <a:r>
+              <a:rPr lang="ko-KR" altLang="en-US"/>
+              <a:t>상태 다이어그램</a:t>
+            </a:r>
+            <a:endParaRPr lang="ko-KR" altLang="en-US"/>
+          </a:p>
+        </p:txBody>
+      </p:sp>
+    </p:spTree>
+    <p:extLst>
+      <p:ext uri="{BB962C8B-B14F-4D97-AF65-F5344CB8AC3E}">
+        <p14:creationId xmlns:p14="http://schemas.microsoft.com/office/powerpoint/2010/main" val="72068593"/>
+      </p:ext>
+    </p:extLst>
+  </p:cSld>
+  <p:clrMapOvr>
+    <a:masterClrMapping/>
+  </p:clrMapOvr>
+  <mc:AlternateContent xmlns:mc="http://schemas.openxmlformats.org/markup-compatibility/2006">
+    <mc:Choice xmlns:p14="http://schemas.microsoft.com/office/powerpoint/2010/main" Requires="p14">
+      <p:transition xmlns:mc="http://schemas.openxmlformats.org/markup-compatibility/2006" xmlns:p14="http://schemas.microsoft.com/office/powerpoint/2010/main" mc:Ignorable="p14" p14:dur="500"/>
+    </mc:Choice>
+    <mc:Fallback>
+      <p:transition/>
+    </mc:Fallback>
+  </mc:AlternateContent>
+</p:sld>
+</file>
+
+<file path=ppt/slides/slide8.xml><?xml version="1.0" encoding="utf-8"?>
+<p:sld xmlns:r="http://schemas.openxmlformats.org/officeDocument/2006/relationships" xmlns:c="http://schemas.openxmlformats.org/drawingml/2006/chart" xmlns:a="http://schemas.openxmlformats.org/drawingml/2006/main" xmlns:dgm="http://schemas.openxmlformats.org/drawingml/2006/diagram" xmlns:dsp="http://schemas.microsoft.com/office/drawing/2008/diagram" xmlns:p="http://schemas.openxmlformats.org/presentationml/2006/main">
+  <p:cSld>
+    <p:spTree>
+      <p:nvGrpSpPr>
+        <p:cNvPr id="1" name=""/>
+        <p:cNvGrpSpPr/>
+        <p:nvPr/>
+      </p:nvGrpSpPr>
+      <p:grpSpPr>
+        <a:xfrm>
+          <a:off x="0" y="0"/>
+          <a:ext cx="0" cy="0"/>
+          <a:chOff x="0" y="0"/>
+          <a:chExt cx="0" cy="0"/>
+        </a:xfrm>
+      </p:grpSpPr>
+      <p:sp>
+        <p:nvSpPr>
+          <p:cNvPr id="2" name="Title 1"/>
+          <p:cNvSpPr>
+            <a:spLocks noGrp="1"/>
+          </p:cNvSpPr>
+          <p:nvPr>
+            <p:ph type="title" idx="0"/>
+          </p:nvPr>
+        </p:nvSpPr>
+        <p:spPr/>
+        <p:txBody>
+          <a:bodyPr/>
+          <a:p>
+            <a:pPr>
+              <a:defRPr/>
+            </a:pPr>
+            <a:r>
+              <a:rPr lang="ko-KR" altLang="en-US"/>
+              <a:t>과제 </a:t>
+            </a:r>
+            <a:r>
+              <a:rPr lang="en-US" altLang="ko-KR"/>
+              <a:t>3</a:t>
+            </a:r>
+            <a:endParaRPr lang="en-US" altLang="ko-KR"/>
+          </a:p>
+        </p:txBody>
+      </p:sp>
+      <p:sp>
+        <p:nvSpPr>
+          <p:cNvPr id="3" name="Content Placeholder 2"/>
+          <p:cNvSpPr>
+            <a:spLocks noGrp="1"/>
+          </p:cNvSpPr>
+          <p:nvPr>
+            <p:ph idx="1"/>
+          </p:nvPr>
+        </p:nvSpPr>
+        <p:spPr/>
+        <p:txBody>
+          <a:bodyPr/>
+          <a:p>
+            <a:pPr>
+              <a:defRPr/>
+            </a:pPr>
+            <a:r>
+              <a:rPr lang="ko-KR" altLang="en-US"/>
+              <a:t/>
+            </a:r>
+            <a:endParaRPr lang="ko-KR" altLang="en-US"/>
+          </a:p>
+        </p:txBody>
+      </p:sp>
+    </p:spTree>
+    <p:extLst>
+      <p:ext uri="{BB962C8B-B14F-4D97-AF65-F5344CB8AC3E}">
+        <p14:creationId xmlns:p14="http://schemas.microsoft.com/office/powerpoint/2010/main" val="326881829"/>
+      </p:ext>
+    </p:extLst>
+  </p:cSld>
+  <p:clrMapOvr>
+    <a:masterClrMapping/>
+  </p:clrMapOvr>
+  <mc:AlternateContent xmlns:mc="http://schemas.openxmlformats.org/markup-compatibility/2006">
+    <mc:Choice xmlns:p14="http://schemas.microsoft.com/office/powerpoint/2010/main" Requires="p14">
+      <p:transition xmlns:mc="http://schemas.openxmlformats.org/markup-compatibility/2006" xmlns:p14="http://schemas.microsoft.com/office/powerpoint/2010/main" mc:Ignorable="p14" p14:dur="500"/>
+    </mc:Choice>
+    <mc:Fallback>
+      <p:transition/>
+    </mc:Fallback>
+  </mc:AlternateContent>
+</p:sld>
+</file>
+
+<file path=ppt/slides/slide9.xml><?xml version="1.0" encoding="utf-8"?>
+<p:sld xmlns:r="http://schemas.openxmlformats.org/officeDocument/2006/relationships" xmlns:c="http://schemas.openxmlformats.org/drawingml/2006/chart" xmlns:a="http://schemas.openxmlformats.org/drawingml/2006/main" xmlns:dgm="http://schemas.openxmlformats.org/drawingml/2006/diagram" xmlns:dsp="http://schemas.microsoft.com/office/drawing/2008/diagram" xmlns:p="http://schemas.openxmlformats.org/presentationml/2006/main">
+  <p:cSld>
+    <p:spTree>
+      <p:nvGrpSpPr>
+        <p:cNvPr id="1" name=""/>
+        <p:cNvGrpSpPr/>
+        <p:nvPr/>
+      </p:nvGrpSpPr>
+      <p:grpSpPr>
+        <a:xfrm>
+          <a:off x="0" y="0"/>
+          <a:ext cx="0" cy="0"/>
+          <a:chOff x="0" y="0"/>
+          <a:chExt cx="0" cy="0"/>
+        </a:xfrm>
+      </p:grpSpPr>
+      <p:sp>
+        <p:nvSpPr>
+          <p:cNvPr id="2" name="Title 1"/>
+          <p:cNvSpPr>
+            <a:spLocks noGrp="1"/>
+          </p:cNvSpPr>
+          <p:nvPr>
+            <p:ph type="title" idx="0"/>
+          </p:nvPr>
+        </p:nvSpPr>
+        <p:spPr/>
+        <p:txBody>
+          <a:bodyPr/>
+          <a:p>
+            <a:pPr>
+              <a:defRPr/>
+            </a:pPr>
+            <a:r>
+              <a:rPr lang="ko-KR" altLang="en-US"/>
+              <a:t>과제 </a:t>
+            </a:r>
+            <a:r>
+              <a:rPr lang="en-US" altLang="ko-KR"/>
+              <a:t>4</a:t>
+            </a:r>
+            <a:endParaRPr lang="en-US" altLang="ko-KR"/>
+          </a:p>
+        </p:txBody>
+      </p:sp>
+      <p:sp>
+        <p:nvSpPr>
+          <p:cNvPr id="3" name="Content Placeholder 2"/>
+          <p:cNvSpPr>
+            <a:spLocks noGrp="1"/>
+          </p:cNvSpPr>
+          <p:nvPr>
+            <p:ph idx="1"/>
+          </p:nvPr>
+        </p:nvSpPr>
+        <p:spPr/>
+        <p:txBody>
+          <a:bodyPr/>
+          <a:p>
+            <a:pPr>
+              <a:defRPr/>
+            </a:pPr>
+            <a:r>
+              <a:rPr lang="en-US" altLang="ko-KR"/>
+              <a:t>Critical System</a:t>
+            </a:r>
+            <a:endParaRPr lang="en-US" altLang="ko-KR"/>
+          </a:p>
+        </p:txBody>
+      </p:sp>
+    </p:spTree>
+    <p:extLst>
+      <p:ext uri="{BB962C8B-B14F-4D97-AF65-F5344CB8AC3E}">
+        <p14:creationId xmlns:p14="http://schemas.microsoft.com/office/powerpoint/2010/main" val="2833622667"/>
+      </p:ext>
+    </p:extLst>
+  </p:cSld>
+  <p:clrMapOvr>
+    <a:masterClrMapping/>
+  </p:clrMapOvr>
+  <mc:AlternateContent xmlns:mc="http://schemas.openxmlformats.org/markup-compatibility/2006">
+    <mc:Choice xmlns:p14="http://schemas.microsoft.com/office/powerpoint/2010/main" Requires="p14">
+      <p:transition xmlns:mc="http://schemas.openxmlformats.org/markup-compatibility/2006" xmlns:p14="http://schemas.microsoft.com/office/powerpoint/2010/main" mc:Ignorable="p14" p14:dur="500"/>
+    </mc:Choice>
+    <mc:Fallback>
+      <p:transition/>
+    </mc:Fallback>
+  </mc:AlternateContent>
 </p:sld>
 </file>
 
 <file path=ppt/theme/theme1.xml><?xml version="1.0" encoding="utf-8"?>
-<a:theme xmlns:a="http://schemas.openxmlformats.org/drawingml/2006/main" name="Office Theme">
+<a:theme xmlns:r="http://schemas.openxmlformats.org/officeDocument/2006/relationships" xmlns:c="http://schemas.openxmlformats.org/drawingml/2006/chart" xmlns:dgm="http://schemas.openxmlformats.org/drawingml/2006/diagram" xmlns:dsp="http://schemas.microsoft.com/office/drawing/2008/diagram" xmlns:a="http://schemas.openxmlformats.org/drawingml/2006/main" xmlns:pic="http://schemas.openxmlformats.org/drawingml/2006/picture" xmlns:wp="http://schemas.openxmlformats.org/drawingml/2006/wordprocessingDrawing" xmlns:xdr="http://schemas.openxmlformats.org/drawingml/2006/spreadsheetDrawing" xmlns:lc="http://schemas.openxmlformats.org/drawingml/2006/lockedCanvas" xmlns:p="http://schemas.openxmlformats.org/presentationml/2006/main" name="Office Theme">
   <a:themeElements>
     <a:clrScheme name="Office">
       <a:dk1>
         <a:sysClr val="windowText" lastClr="000000"/>
       </a:dk1>
       <a:lt1>
-        <a:sysClr val="window" lastClr="FFFFFF"/>
+        <a:sysClr val="window" lastClr="ffffff"/>
       </a:lt1>
       <a:dk2>
-        <a:srgbClr val="0E2841"/>
+        <a:srgbClr val="0e2841"/>
       </a:dk2>
       <a:lt2>
-        <a:srgbClr val="E8E8E8"/>
+        <a:srgbClr val="e8e8e8"/>
       </a:lt2>
       <a:accent1>
         <a:srgbClr val="156082"/>
       </a:accent1>
       <a:accent2>
-        <a:srgbClr val="E97132"/>
+        <a:srgbClr val="e97132"/>
       </a:accent2>
       <a:accent3>
-        <a:srgbClr val="196B24"/>
+        <a:srgbClr val="196b24"/>
       </a:accent3>
       <a:accent4>
-        <a:srgbClr val="0F9ED5"/>
+        <a:srgbClr val="0f9ed5"/>
       </a:accent4>
       <a:accent5>
-        <a:srgbClr val="A02B93"/>
+        <a:srgbClr val="a02b93"/>
       </a:accent5>
       <a:accent6>
-        <a:srgbClr val="4EA72E"/>
+        <a:srgbClr val="4ea72e"/>
       </a:accent6>
       <a:hlink>
         <a:srgbClr val="467886"/>
       </a:hlink>
       <a:folHlink>
-        <a:srgbClr val="96607D"/>
+        <a:srgbClr val="96607d"/>
       </a:folHlink>
     </a:clrScheme>
     <a:fontScheme name="Office">
@@ -3579,7 +6141,7 @@
         <a:latin typeface="맑은 고딕" panose="02110004020202020204"/>
         <a:ea typeface=""/>
         <a:cs typeface=""/>
-        <a:font script="Jpan" typeface="游ゴシック Light"/>
+        <a:font script="Jpan" typeface="Yu Gothic Light"/>
         <a:font script="Hang" typeface="맑은 고딕"/>
         <a:font script="Hans" typeface="等线 Light"/>
         <a:font script="Hant" typeface="新細明體"/>
@@ -3631,7 +6193,7 @@
         <a:latin typeface="맑은 고딕" panose="02110004020202020204"/>
         <a:ea typeface=""/>
         <a:cs typeface=""/>
-        <a:font script="Jpan" typeface="游ゴシック"/>
+        <a:font script="Jpan" typeface="Yu Gothic"/>
         <a:font script="Hang" typeface="맑은 고딕"/>
         <a:font script="Hans" typeface="等线"/>
         <a:font script="Hant" typeface="新細明體"/>
@@ -3744,21 +6306,21 @@
             <a:schemeClr val="phClr"/>
           </a:solidFill>
           <a:prstDash val="solid"/>
-          <a:miter lim="800000"/>
+          <a:miter/>
         </a:ln>
         <a:ln w="19050" cap="flat" cmpd="sng" algn="ctr">
           <a:solidFill>
             <a:schemeClr val="phClr"/>
           </a:solidFill>
           <a:prstDash val="solid"/>
-          <a:miter lim="800000"/>
+          <a:miter/>
         </a:ln>
         <a:ln w="25400" cap="flat" cmpd="sng" algn="ctr">
           <a:solidFill>
             <a:schemeClr val="phClr"/>
           </a:solidFill>
           <a:prstDash val="solid"/>
-          <a:miter lim="800000"/>
+          <a:miter/>
         </a:ln>
       </a:lnStyleLst>
       <a:effectStyleLst>
@@ -3819,6 +6381,27 @@
     </a:fmtScheme>
   </a:themeElements>
   <a:objectDefaults>
+    <a:spDef>
+      <a:spPr/>
+      <a:bodyPr/>
+      <a:lstStyle/>
+      <a:style>
+        <a:lnRef idx="2">
+          <a:schemeClr val="accent1">
+            <a:shade val="20000"/>
+          </a:schemeClr>
+        </a:lnRef>
+        <a:fillRef idx="1">
+          <a:schemeClr val="accent1"/>
+        </a:fillRef>
+        <a:effectRef idx="0">
+          <a:schemeClr val="accent1"/>
+        </a:effectRef>
+        <a:fontRef idx="minor">
+          <a:schemeClr val="lt1"/>
+        </a:fontRef>
+      </a:style>
+    </a:spDef>
     <a:lnDef>
       <a:spPr/>
       <a:bodyPr/>
@@ -3838,12 +6421,11 @@
         </a:fontRef>
       </a:style>
     </a:lnDef>
+    <a:txDef>
+      <a:spPr/>
+      <a:bodyPr/>
+      <a:lstStyle/>
+    </a:txDef>
   </a:objectDefaults>
-  <a:extraClrSchemeLst/>
-  <a:extLst>
-    <a:ext uri="{05A4C25C-085E-4340-85A3-A5531E510DB2}">
-      <thm15:themeFamily xmlns:thm15="http://schemas.microsoft.com/office/thememl/2012/main" name="Office Theme" id="{2E142A2C-CD16-42D6-873A-C26D2A0506FA}" vid="{1BDDFF52-6CD6-40A5-AB3C-68EB2F1E4D0A}"/>
-    </a:ext>
-  </a:extLst>
 </a:theme>
 </file>
</xml_diff>